<commit_message>
Added Solution for tasks 03,04,05;
</commit_message>
<xml_diff>
--- a/03. C# Advanced/01. C# Advanced/09. Generics/08. CSharp-Advanced-Generics.pptx
+++ b/03. C# Advanced/01. C# Advanced/09. Generics/08. CSharp-Advanced-Generics.pptx
@@ -5,10 +5,10 @@
     <p:sldMasterId id="2147483675" r:id="rId1"/>
   </p:sldMasterIdLst>
   <p:notesMasterIdLst>
-    <p:notesMasterId r:id="rId31"/>
+    <p:notesMasterId r:id="rId33"/>
   </p:notesMasterIdLst>
   <p:handoutMasterIdLst>
-    <p:handoutMasterId r:id="rId32"/>
+    <p:handoutMasterId r:id="rId34"/>
   </p:handoutMasterIdLst>
   <p:sldIdLst>
     <p:sldId id="297" r:id="rId2"/>
@@ -18,28 +18,30 @@
     <p:sldId id="301" r:id="rId6"/>
     <p:sldId id="302" r:id="rId7"/>
     <p:sldId id="303" r:id="rId8"/>
-    <p:sldId id="304" r:id="rId9"/>
-    <p:sldId id="305" r:id="rId10"/>
-    <p:sldId id="306" r:id="rId11"/>
-    <p:sldId id="307" r:id="rId12"/>
-    <p:sldId id="308" r:id="rId13"/>
-    <p:sldId id="309" r:id="rId14"/>
-    <p:sldId id="310" r:id="rId15"/>
-    <p:sldId id="311" r:id="rId16"/>
-    <p:sldId id="312" r:id="rId17"/>
-    <p:sldId id="313" r:id="rId18"/>
-    <p:sldId id="314" r:id="rId19"/>
-    <p:sldId id="315" r:id="rId20"/>
-    <p:sldId id="316" r:id="rId21"/>
-    <p:sldId id="317" r:id="rId22"/>
-    <p:sldId id="318" r:id="rId23"/>
-    <p:sldId id="319" r:id="rId24"/>
-    <p:sldId id="320" r:id="rId25"/>
-    <p:sldId id="321" r:id="rId26"/>
-    <p:sldId id="322" r:id="rId27"/>
-    <p:sldId id="401" r:id="rId28"/>
-    <p:sldId id="405" r:id="rId29"/>
-    <p:sldId id="493" r:id="rId30"/>
+    <p:sldId id="495" r:id="rId9"/>
+    <p:sldId id="304" r:id="rId10"/>
+    <p:sldId id="305" r:id="rId11"/>
+    <p:sldId id="306" r:id="rId12"/>
+    <p:sldId id="496" r:id="rId13"/>
+    <p:sldId id="307" r:id="rId14"/>
+    <p:sldId id="308" r:id="rId15"/>
+    <p:sldId id="309" r:id="rId16"/>
+    <p:sldId id="310" r:id="rId17"/>
+    <p:sldId id="311" r:id="rId18"/>
+    <p:sldId id="312" r:id="rId19"/>
+    <p:sldId id="313" r:id="rId20"/>
+    <p:sldId id="314" r:id="rId21"/>
+    <p:sldId id="315" r:id="rId22"/>
+    <p:sldId id="316" r:id="rId23"/>
+    <p:sldId id="317" r:id="rId24"/>
+    <p:sldId id="318" r:id="rId25"/>
+    <p:sldId id="319" r:id="rId26"/>
+    <p:sldId id="320" r:id="rId27"/>
+    <p:sldId id="321" r:id="rId28"/>
+    <p:sldId id="322" r:id="rId29"/>
+    <p:sldId id="401" r:id="rId30"/>
+    <p:sldId id="405" r:id="rId31"/>
+    <p:sldId id="493" r:id="rId32"/>
   </p:sldIdLst>
   <p:sldSz cx="12192000" cy="6858000"/>
   <p:notesSz cx="6858000" cy="9144000"/>
@@ -158,6 +160,7 @@
         </p14:section>
         <p14:section name="Generic Classes" id="{2B12C821-48DC-4EA7-B2CE-47255089C530}">
           <p14:sldIdLst>
+            <p14:sldId id="495"/>
             <p14:sldId id="304"/>
             <p14:sldId id="305"/>
             <p14:sldId id="306"/>
@@ -165,6 +168,7 @@
         </p14:section>
         <p14:section name="Generic Methods" id="{D3A50630-1D72-489B-A5F9-8B91B0D5492A}">
           <p14:sldIdLst>
+            <p14:sldId id="496"/>
             <p14:sldId id="307"/>
             <p14:sldId id="308"/>
             <p14:sldId id="309"/>
@@ -319,7 +323,7 @@
           <a:p>
             <a:fld id="{4E087215-0C8F-4762-A664-737A353EC9A4}" type="datetimeFigureOut">
               <a:rPr lang="bg-BG" smtClean="0"/>
-              <a:t>16.6.2020 г.</a:t>
+              <a:t>18.6.2020 г.</a:t>
             </a:fld>
             <a:endParaRPr lang="bg-BG"/>
           </a:p>
@@ -510,7 +514,7 @@
           <a:p>
             <a:fld id="{72D84649-876A-46C9-8472-14CB09C070D8}" type="datetimeFigureOut">
               <a:rPr lang="en-US" smtClean="0"/>
-              <a:t>6/16/2020</a:t>
+              <a:t>6/18/2020</a:t>
             </a:fld>
             <a:endParaRPr lang="en-US"/>
           </a:p>
@@ -974,7 +978,7 @@
             <a:fld id="{3EBA5BD7-F043-4D1B-AA17-CD412FC534DE}" type="slidenum">
               <a:rPr lang="en-US" smtClean="0"/>
               <a:pPr/>
-              <a:t>19</a:t>
+              <a:t>21</a:t>
             </a:fld>
             <a:endParaRPr lang="en-US" dirty="0"/>
           </a:p>
@@ -1109,7 +1113,7 @@
             <a:fld id="{3EBA5BD7-F043-4D1B-AA17-CD412FC534DE}" type="slidenum">
               <a:rPr lang="en-US" smtClean="0"/>
               <a:pPr/>
-              <a:t>20</a:t>
+              <a:t>22</a:t>
             </a:fld>
             <a:endParaRPr lang="en-US" dirty="0"/>
           </a:p>
@@ -1244,7 +1248,7 @@
             <a:fld id="{3EBA5BD7-F043-4D1B-AA17-CD412FC534DE}" type="slidenum">
               <a:rPr lang="en-US" smtClean="0"/>
               <a:pPr/>
-              <a:t>21</a:t>
+              <a:t>23</a:t>
             </a:fld>
             <a:endParaRPr lang="en-US" dirty="0"/>
           </a:p>
@@ -1379,7 +1383,7 @@
             <a:fld id="{3EBA5BD7-F043-4D1B-AA17-CD412FC534DE}" type="slidenum">
               <a:rPr lang="en-US" smtClean="0"/>
               <a:pPr/>
-              <a:t>22</a:t>
+              <a:t>24</a:t>
             </a:fld>
             <a:endParaRPr lang="en-US" dirty="0"/>
           </a:p>
@@ -1514,7 +1518,7 @@
             <a:fld id="{3EBA5BD7-F043-4D1B-AA17-CD412FC534DE}" type="slidenum">
               <a:rPr lang="en-US" smtClean="0"/>
               <a:pPr/>
-              <a:t>23</a:t>
+              <a:t>25</a:t>
             </a:fld>
             <a:endParaRPr lang="en-US" dirty="0"/>
           </a:p>
@@ -1695,7 +1699,7 @@
                 <a:tabLst/>
                 <a:defRPr/>
               </a:pPr>
-              <a:t>26</a:t>
+              <a:t>28</a:t>
             </a:fld>
             <a:endParaRPr kumimoji="0" lang="en-US" sz="1200" b="0" i="0" u="none" strike="noStrike" kern="1200" cap="none" spc="0" normalizeH="0" baseline="0" noProof="0" dirty="0">
               <a:ln>
@@ -1949,7 +1953,7 @@
             <a:fld id="{3EBA5BD7-F043-4D1B-AA17-CD412FC534DE}" type="slidenum">
               <a:rPr lang="en-US" smtClean="0"/>
               <a:pPr/>
-              <a:t>27</a:t>
+              <a:t>29</a:t>
             </a:fld>
             <a:endParaRPr lang="en-US" dirty="0"/>
           </a:p>
@@ -2190,7 +2194,7 @@
             <a:fld id="{3EBA5BD7-F043-4D1B-AA17-CD412FC534DE}" type="slidenum">
               <a:rPr lang="en-US" smtClean="0"/>
               <a:pPr/>
-              <a:t>28</a:t>
+              <a:t>30</a:t>
             </a:fld>
             <a:endParaRPr lang="en-US" dirty="0"/>
           </a:p>
@@ -2431,7 +2435,7 @@
             <a:fld id="{3EBA5BD7-F043-4D1B-AA17-CD412FC534DE}" type="slidenum">
               <a:rPr lang="en-US" smtClean="0"/>
               <a:pPr/>
-              <a:t>29</a:t>
+              <a:t>31</a:t>
             </a:fld>
             <a:endParaRPr lang="en-US" dirty="0"/>
           </a:p>
@@ -3225,7 +3229,7 @@
             <a:fld id="{3EBA5BD7-F043-4D1B-AA17-CD412FC534DE}" type="slidenum">
               <a:rPr lang="en-US" smtClean="0"/>
               <a:pPr/>
-              <a:t>10</a:t>
+              <a:t>11</a:t>
             </a:fld>
             <a:endParaRPr lang="en-US" dirty="0"/>
           </a:p>
@@ -3359,7 +3363,7 @@
           <a:p>
             <a:fld id="{2BF067CD-8E6B-4360-9AA8-C5DF2A48A6D1}" type="slidenum">
               <a:rPr lang="en-US" smtClean="0"/>
-              <a:t>13</a:t>
+              <a:t>15</a:t>
             </a:fld>
             <a:endParaRPr lang="en-US" dirty="0"/>
           </a:p>
@@ -3493,7 +3497,7 @@
           <a:p>
             <a:fld id="{2BF067CD-8E6B-4360-9AA8-C5DF2A48A6D1}" type="slidenum">
               <a:rPr lang="en-US" smtClean="0"/>
-              <a:t>15</a:t>
+              <a:t>17</a:t>
             </a:fld>
             <a:endParaRPr lang="en-US" dirty="0"/>
           </a:p>
@@ -3628,7 +3632,7 @@
             <a:fld id="{3EBA5BD7-F043-4D1B-AA17-CD412FC534DE}" type="slidenum">
               <a:rPr lang="en-US" smtClean="0"/>
               <a:pPr/>
-              <a:t>18</a:t>
+              <a:t>20</a:t>
             </a:fld>
             <a:endParaRPr lang="en-US" dirty="0"/>
           </a:p>
@@ -12825,6 +12829,651 @@
       </p:grpSpPr>
       <p:sp>
         <p:nvSpPr>
+          <p:cNvPr id="3" name="Title 2">
+            <a:extLst>
+              <a:ext uri="{FF2B5EF4-FFF2-40B4-BE49-F238E27FC236}">
+                <a16:creationId xmlns:a16="http://schemas.microsoft.com/office/drawing/2014/main" id="{AA9976E6-2ADB-413C-8F13-DA6222355395}"/>
+              </a:ext>
+            </a:extLst>
+          </p:cNvPr>
+          <p:cNvSpPr>
+            <a:spLocks noGrp="1"/>
+          </p:cNvSpPr>
+          <p:nvPr>
+            <p:ph type="title"/>
+          </p:nvPr>
+        </p:nvSpPr>
+        <p:spPr/>
+        <p:txBody>
+          <a:bodyPr/>
+          <a:lstStyle/>
+          <a:p>
+            <a:r>
+              <a:rPr lang="en-US" dirty="0"/>
+              <a:t>Non-Generic Classes (2)</a:t>
+            </a:r>
+          </a:p>
+        </p:txBody>
+      </p:sp>
+      <p:sp>
+        <p:nvSpPr>
+          <p:cNvPr id="6" name="Rectangle 5">
+            <a:extLst>
+              <a:ext uri="{FF2B5EF4-FFF2-40B4-BE49-F238E27FC236}">
+                <a16:creationId xmlns:a16="http://schemas.microsoft.com/office/drawing/2014/main" id="{043CAAB1-1BB5-4293-8AF9-ED1802C625D6}"/>
+              </a:ext>
+            </a:extLst>
+          </p:cNvPr>
+          <p:cNvSpPr>
+            <a:spLocks noChangeArrowheads="1"/>
+          </p:cNvSpPr>
+          <p:nvPr/>
+        </p:nvSpPr>
+        <p:spPr bwMode="auto">
+          <a:xfrm>
+            <a:off x="841248" y="2259000"/>
+            <a:ext cx="10509504" cy="3517032"/>
+          </a:xfrm>
+          <a:prstGeom prst="rect">
+            <a:avLst/>
+          </a:prstGeom>
+          <a:solidFill>
+            <a:schemeClr val="tx1">
+              <a:lumMod val="40000"/>
+              <a:lumOff val="60000"/>
+              <a:alpha val="15000"/>
+            </a:schemeClr>
+          </a:solidFill>
+          <a:ln w="12700">
+            <a:solidFill>
+              <a:schemeClr val="accent5">
+                <a:lumMod val="60000"/>
+                <a:lumOff val="40000"/>
+              </a:schemeClr>
+            </a:solidFill>
+          </a:ln>
+        </p:spPr>
+        <p:txBody>
+          <a:bodyPr wrap="square" lIns="432000" tIns="183600" rIns="432000" bIns="183600">
+            <a:spAutoFit/>
+          </a:bodyPr>
+          <a:lstStyle/>
+          <a:p>
+            <a:pPr eaLnBrk="0" hangingPunct="0">
+              <a:lnSpc>
+                <a:spcPct val="105000"/>
+              </a:lnSpc>
+              <a:buClr>
+                <a:schemeClr val="accent5">
+                  <a:lumMod val="40000"/>
+                  <a:lumOff val="60000"/>
+                </a:schemeClr>
+              </a:buClr>
+              <a:buSzPct val="70000"/>
+            </a:pPr>
+            <a:r>
+              <a:rPr lang="en-US" sz="2800" b="1" noProof="1">
+                <a:latin typeface="Consolas" pitchFamily="49" charset="0"/>
+                <a:cs typeface="Consolas" pitchFamily="49" charset="0"/>
+              </a:rPr>
+              <a:t>var objectList = new </a:t>
+            </a:r>
+            <a:r>
+              <a:rPr lang="en-US" sz="2800" b="1" noProof="1">
+                <a:solidFill>
+                  <a:schemeClr val="bg1"/>
+                </a:solidFill>
+                <a:latin typeface="Consolas" pitchFamily="49" charset="0"/>
+                <a:cs typeface="Consolas" pitchFamily="49" charset="0"/>
+              </a:rPr>
+              <a:t>ObjectList();</a:t>
+            </a:r>
+          </a:p>
+          <a:p>
+            <a:pPr eaLnBrk="0" hangingPunct="0">
+              <a:lnSpc>
+                <a:spcPct val="105000"/>
+              </a:lnSpc>
+              <a:buClr>
+                <a:schemeClr val="accent5">
+                  <a:lumMod val="40000"/>
+                  <a:lumOff val="60000"/>
+                </a:schemeClr>
+              </a:buClr>
+              <a:buSzPct val="70000"/>
+            </a:pPr>
+            <a:r>
+              <a:rPr lang="en-US" sz="2800" b="1" noProof="1">
+                <a:latin typeface="Consolas" pitchFamily="49" charset="0"/>
+                <a:cs typeface="Consolas" pitchFamily="49" charset="0"/>
+              </a:rPr>
+              <a:t>objectList.Add(1);</a:t>
+            </a:r>
+          </a:p>
+          <a:p>
+            <a:pPr eaLnBrk="0" hangingPunct="0">
+              <a:lnSpc>
+                <a:spcPct val="105000"/>
+              </a:lnSpc>
+              <a:buClr>
+                <a:schemeClr val="accent5">
+                  <a:lumMod val="40000"/>
+                  <a:lumOff val="60000"/>
+                </a:schemeClr>
+              </a:buClr>
+              <a:buSzPct val="70000"/>
+            </a:pPr>
+            <a:r>
+              <a:rPr lang="en-US" sz="2800" b="1" noProof="1">
+                <a:latin typeface="Consolas" pitchFamily="49" charset="0"/>
+                <a:cs typeface="Consolas" pitchFamily="49" charset="0"/>
+              </a:rPr>
+              <a:t>objectList.Add(new Customer());</a:t>
+            </a:r>
+          </a:p>
+          <a:p>
+            <a:pPr eaLnBrk="0" hangingPunct="0">
+              <a:lnSpc>
+                <a:spcPct val="105000"/>
+              </a:lnSpc>
+              <a:buClr>
+                <a:schemeClr val="accent5">
+                  <a:lumMod val="40000"/>
+                  <a:lumOff val="60000"/>
+                </a:schemeClr>
+              </a:buClr>
+              <a:buSzPct val="70000"/>
+            </a:pPr>
+            <a:r>
+              <a:rPr lang="en-US" sz="2800" b="1" noProof="1">
+                <a:latin typeface="Consolas" pitchFamily="49" charset="0"/>
+                <a:cs typeface="Consolas" pitchFamily="49" charset="0"/>
+              </a:rPr>
+              <a:t>objectList.Add(new Account());</a:t>
+            </a:r>
+          </a:p>
+          <a:p>
+            <a:pPr eaLnBrk="0" hangingPunct="0">
+              <a:lnSpc>
+                <a:spcPct val="105000"/>
+              </a:lnSpc>
+              <a:buClr>
+                <a:schemeClr val="accent5">
+                  <a:lumMod val="40000"/>
+                  <a:lumOff val="60000"/>
+                </a:schemeClr>
+              </a:buClr>
+              <a:buSzPct val="70000"/>
+            </a:pPr>
+            <a:endParaRPr lang="en-US" sz="2800" b="1" noProof="1">
+              <a:latin typeface="Consolas" pitchFamily="49" charset="0"/>
+              <a:cs typeface="Consolas" pitchFamily="49" charset="0"/>
+            </a:endParaRPr>
+          </a:p>
+          <a:p>
+            <a:pPr eaLnBrk="0" hangingPunct="0">
+              <a:lnSpc>
+                <a:spcPct val="105000"/>
+              </a:lnSpc>
+              <a:buClr>
+                <a:schemeClr val="accent5">
+                  <a:lumMod val="40000"/>
+                  <a:lumOff val="60000"/>
+                </a:schemeClr>
+              </a:buClr>
+              <a:buSzPct val="70000"/>
+            </a:pPr>
+            <a:r>
+              <a:rPr lang="en-US" sz="2800" b="1" noProof="1">
+                <a:latin typeface="Consolas" pitchFamily="49" charset="0"/>
+              </a:rPr>
+              <a:t>var firItem = objectList[0];</a:t>
+            </a:r>
+            <a:r>
+              <a:rPr lang="en-US" sz="2800" b="1" noProof="1">
+                <a:solidFill>
+                  <a:schemeClr val="tx2"/>
+                </a:solidFill>
+                <a:latin typeface="Consolas" pitchFamily="49" charset="0"/>
+              </a:rPr>
+              <a:t> </a:t>
+            </a:r>
+            <a:r>
+              <a:rPr lang="en-US" sz="2800" b="1" i="1" noProof="1">
+                <a:solidFill>
+                  <a:schemeClr val="accent2"/>
+                </a:solidFill>
+                <a:latin typeface="Consolas" pitchFamily="49" charset="0"/>
+                <a:cs typeface="Consolas" pitchFamily="49" charset="0"/>
+              </a:rPr>
+              <a:t>// firItem is object</a:t>
+            </a:r>
+          </a:p>
+          <a:p>
+            <a:pPr eaLnBrk="0" hangingPunct="0">
+              <a:lnSpc>
+                <a:spcPct val="105000"/>
+              </a:lnSpc>
+              <a:buClr>
+                <a:schemeClr val="accent5">
+                  <a:lumMod val="40000"/>
+                  <a:lumOff val="60000"/>
+                </a:schemeClr>
+              </a:buClr>
+              <a:buSzPct val="70000"/>
+            </a:pPr>
+            <a:r>
+              <a:rPr lang="en-US" sz="2800" b="1" noProof="1">
+                <a:latin typeface="Consolas" pitchFamily="49" charset="0"/>
+              </a:rPr>
+              <a:t>var secItem = (</a:t>
+            </a:r>
+            <a:r>
+              <a:rPr lang="en-US" sz="2800" b="1" noProof="1">
+                <a:solidFill>
+                  <a:schemeClr val="bg1"/>
+                </a:solidFill>
+                <a:latin typeface="Consolas" pitchFamily="49" charset="0"/>
+              </a:rPr>
+              <a:t>Customer</a:t>
+            </a:r>
+            <a:r>
+              <a:rPr lang="en-US" sz="2800" b="1" noProof="1">
+                <a:latin typeface="Consolas" pitchFamily="49" charset="0"/>
+              </a:rPr>
+              <a:t>)objectList[</a:t>
+            </a:r>
+            <a:r>
+              <a:rPr lang="bg-BG" sz="2800" b="1" noProof="1">
+                <a:latin typeface="Consolas" pitchFamily="49" charset="0"/>
+              </a:rPr>
+              <a:t>1</a:t>
+            </a:r>
+            <a:r>
+              <a:rPr lang="en-US" sz="2800" b="1" noProof="1">
+                <a:latin typeface="Consolas" pitchFamily="49" charset="0"/>
+              </a:rPr>
+              <a:t>]; </a:t>
+            </a:r>
+            <a:r>
+              <a:rPr lang="en-US" sz="2800" b="1" i="1" noProof="1">
+                <a:solidFill>
+                  <a:schemeClr val="accent2"/>
+                </a:solidFill>
+                <a:latin typeface="Consolas" pitchFamily="49" charset="0"/>
+              </a:rPr>
+              <a:t>// cast</a:t>
+            </a:r>
+            <a:endParaRPr lang="en-US" sz="2800" b="1" noProof="1">
+              <a:solidFill>
+                <a:schemeClr val="tx2"/>
+              </a:solidFill>
+              <a:latin typeface="Consolas" pitchFamily="49" charset="0"/>
+            </a:endParaRPr>
+          </a:p>
+        </p:txBody>
+      </p:sp>
+      <p:sp>
+        <p:nvSpPr>
+          <p:cNvPr id="7" name="Slide Number">
+            <a:extLst>
+              <a:ext uri="{FF2B5EF4-FFF2-40B4-BE49-F238E27FC236}">
+                <a16:creationId xmlns:a16="http://schemas.microsoft.com/office/drawing/2014/main" id="{642C83EC-1CF0-4404-9F04-6ED1A01704B5}"/>
+              </a:ext>
+            </a:extLst>
+          </p:cNvPr>
+          <p:cNvSpPr>
+            <a:spLocks noGrp="1"/>
+          </p:cNvSpPr>
+          <p:nvPr>
+            <p:ph type="sldNum" sz="quarter" idx="5"/>
+          </p:nvPr>
+        </p:nvSpPr>
+        <p:spPr>
+          <a:xfrm>
+            <a:off x="11753030" y="6507000"/>
+            <a:ext cx="367414" cy="297000"/>
+          </a:xfrm>
+          <a:prstGeom prst="rect">
+            <a:avLst/>
+          </a:prstGeom>
+        </p:spPr>
+        <p:txBody>
+          <a:bodyPr vert="horz" lIns="91440" tIns="45720" rIns="91440" bIns="45720" rtlCol="0" anchor="b"/>
+          <a:lstStyle>
+            <a:lvl1pPr algn="r">
+              <a:defRPr sz="1000"/>
+            </a:lvl1pPr>
+          </a:lstStyle>
+          <a:p>
+            <a:fld id="{2BF067CD-8E6B-4360-9AA8-C5DF2A48A6D1}" type="slidenum">
+              <a:rPr lang="en-US" noProof="0" smtClean="0"/>
+              <a:pPr/>
+              <a:t>10</a:t>
+            </a:fld>
+            <a:endParaRPr lang="en-US" noProof="0" dirty="0"/>
+          </a:p>
+        </p:txBody>
+      </p:sp>
+    </p:spTree>
+    <p:extLst>
+      <p:ext uri="{BB962C8B-B14F-4D97-AF65-F5344CB8AC3E}">
+        <p14:creationId xmlns:p14="http://schemas.microsoft.com/office/powerpoint/2010/main" val="1772326377"/>
+      </p:ext>
+    </p:extLst>
+  </p:cSld>
+  <p:clrMapOvr>
+    <a:masterClrMapping/>
+  </p:clrMapOvr>
+  <mc:AlternateContent xmlns:mc="http://schemas.openxmlformats.org/markup-compatibility/2006" xmlns:p14="http://schemas.microsoft.com/office/powerpoint/2010/main">
+    <mc:Choice Requires="p14">
+      <p:transition spd="med" p14:dur="700" advClick="0" advTm="5000">
+        <p:fade/>
+      </p:transition>
+    </mc:Choice>
+    <mc:Fallback xmlns="">
+      <p:transition spd="med" advClick="0" advTm="5000">
+        <p:fade/>
+      </p:transition>
+    </mc:Fallback>
+  </mc:AlternateContent>
+  <p:timing>
+    <p:tnLst>
+      <p:par>
+        <p:cTn id="1" dur="indefinite" restart="never" nodeType="tmRoot">
+          <p:childTnLst>
+            <p:seq concurrent="1" nextAc="seek">
+              <p:cTn id="2" dur="indefinite" nodeType="mainSeq">
+                <p:childTnLst>
+                  <p:par>
+                    <p:cTn id="3" fill="hold">
+                      <p:stCondLst>
+                        <p:cond delay="indefinite"/>
+                      </p:stCondLst>
+                      <p:childTnLst>
+                        <p:par>
+                          <p:cTn id="4" fill="hold">
+                            <p:stCondLst>
+                              <p:cond delay="0"/>
+                            </p:stCondLst>
+                            <p:childTnLst>
+                              <p:par>
+                                <p:cTn id="5" presetID="1" presetClass="entr" presetSubtype="0" fill="hold" nodeType="clickEffect">
+                                  <p:stCondLst>
+                                    <p:cond delay="0"/>
+                                  </p:stCondLst>
+                                  <p:childTnLst>
+                                    <p:set>
+                                      <p:cBhvr>
+                                        <p:cTn id="6" dur="1" fill="hold">
+                                          <p:stCondLst>
+                                            <p:cond delay="0"/>
+                                          </p:stCondLst>
+                                        </p:cTn>
+                                        <p:tgtEl>
+                                          <p:spTgt spid="6">
+                                            <p:txEl>
+                                              <p:pRg st="1" end="1"/>
+                                            </p:txEl>
+                                          </p:spTgt>
+                                        </p:tgtEl>
+                                        <p:attrNameLst>
+                                          <p:attrName>style.visibility</p:attrName>
+                                        </p:attrNameLst>
+                                      </p:cBhvr>
+                                      <p:to>
+                                        <p:strVal val="visible"/>
+                                      </p:to>
+                                    </p:set>
+                                  </p:childTnLst>
+                                </p:cTn>
+                              </p:par>
+                            </p:childTnLst>
+                          </p:cTn>
+                        </p:par>
+                      </p:childTnLst>
+                    </p:cTn>
+                  </p:par>
+                  <p:par>
+                    <p:cTn id="7" fill="hold">
+                      <p:stCondLst>
+                        <p:cond delay="indefinite"/>
+                      </p:stCondLst>
+                      <p:childTnLst>
+                        <p:par>
+                          <p:cTn id="8" fill="hold">
+                            <p:stCondLst>
+                              <p:cond delay="0"/>
+                            </p:stCondLst>
+                            <p:childTnLst>
+                              <p:par>
+                                <p:cTn id="9" presetID="1" presetClass="entr" presetSubtype="0" fill="hold" nodeType="clickEffect">
+                                  <p:stCondLst>
+                                    <p:cond delay="0"/>
+                                  </p:stCondLst>
+                                  <p:childTnLst>
+                                    <p:set>
+                                      <p:cBhvr>
+                                        <p:cTn id="10" dur="1" fill="hold">
+                                          <p:stCondLst>
+                                            <p:cond delay="0"/>
+                                          </p:stCondLst>
+                                        </p:cTn>
+                                        <p:tgtEl>
+                                          <p:spTgt spid="6">
+                                            <p:txEl>
+                                              <p:pRg st="2" end="2"/>
+                                            </p:txEl>
+                                          </p:spTgt>
+                                        </p:tgtEl>
+                                        <p:attrNameLst>
+                                          <p:attrName>style.visibility</p:attrName>
+                                        </p:attrNameLst>
+                                      </p:cBhvr>
+                                      <p:to>
+                                        <p:strVal val="visible"/>
+                                      </p:to>
+                                    </p:set>
+                                  </p:childTnLst>
+                                </p:cTn>
+                              </p:par>
+                            </p:childTnLst>
+                          </p:cTn>
+                        </p:par>
+                      </p:childTnLst>
+                    </p:cTn>
+                  </p:par>
+                  <p:par>
+                    <p:cTn id="11" fill="hold">
+                      <p:stCondLst>
+                        <p:cond delay="indefinite"/>
+                      </p:stCondLst>
+                      <p:childTnLst>
+                        <p:par>
+                          <p:cTn id="12" fill="hold">
+                            <p:stCondLst>
+                              <p:cond delay="0"/>
+                            </p:stCondLst>
+                            <p:childTnLst>
+                              <p:par>
+                                <p:cTn id="13" presetID="1" presetClass="entr" presetSubtype="0" fill="hold" nodeType="clickEffect">
+                                  <p:stCondLst>
+                                    <p:cond delay="0"/>
+                                  </p:stCondLst>
+                                  <p:childTnLst>
+                                    <p:set>
+                                      <p:cBhvr>
+                                        <p:cTn id="14" dur="1" fill="hold">
+                                          <p:stCondLst>
+                                            <p:cond delay="0"/>
+                                          </p:stCondLst>
+                                        </p:cTn>
+                                        <p:tgtEl>
+                                          <p:spTgt spid="6">
+                                            <p:txEl>
+                                              <p:pRg st="3" end="3"/>
+                                            </p:txEl>
+                                          </p:spTgt>
+                                        </p:tgtEl>
+                                        <p:attrNameLst>
+                                          <p:attrName>style.visibility</p:attrName>
+                                        </p:attrNameLst>
+                                      </p:cBhvr>
+                                      <p:to>
+                                        <p:strVal val="visible"/>
+                                      </p:to>
+                                    </p:set>
+                                  </p:childTnLst>
+                                </p:cTn>
+                              </p:par>
+                            </p:childTnLst>
+                          </p:cTn>
+                        </p:par>
+                      </p:childTnLst>
+                    </p:cTn>
+                  </p:par>
+                  <p:par>
+                    <p:cTn id="15" fill="hold">
+                      <p:stCondLst>
+                        <p:cond delay="indefinite"/>
+                      </p:stCondLst>
+                      <p:childTnLst>
+                        <p:par>
+                          <p:cTn id="16" fill="hold">
+                            <p:stCondLst>
+                              <p:cond delay="0"/>
+                            </p:stCondLst>
+                            <p:childTnLst>
+                              <p:par>
+                                <p:cTn id="17" presetID="1" presetClass="entr" presetSubtype="0" fill="hold" nodeType="clickEffect">
+                                  <p:stCondLst>
+                                    <p:cond delay="0"/>
+                                  </p:stCondLst>
+                                  <p:childTnLst>
+                                    <p:set>
+                                      <p:cBhvr>
+                                        <p:cTn id="18" dur="1" fill="hold">
+                                          <p:stCondLst>
+                                            <p:cond delay="0"/>
+                                          </p:stCondLst>
+                                        </p:cTn>
+                                        <p:tgtEl>
+                                          <p:spTgt spid="6">
+                                            <p:txEl>
+                                              <p:pRg st="5" end="5"/>
+                                            </p:txEl>
+                                          </p:spTgt>
+                                        </p:tgtEl>
+                                        <p:attrNameLst>
+                                          <p:attrName>style.visibility</p:attrName>
+                                        </p:attrNameLst>
+                                      </p:cBhvr>
+                                      <p:to>
+                                        <p:strVal val="visible"/>
+                                      </p:to>
+                                    </p:set>
+                                  </p:childTnLst>
+                                </p:cTn>
+                              </p:par>
+                            </p:childTnLst>
+                          </p:cTn>
+                        </p:par>
+                      </p:childTnLst>
+                    </p:cTn>
+                  </p:par>
+                  <p:par>
+                    <p:cTn id="19" fill="hold">
+                      <p:stCondLst>
+                        <p:cond delay="indefinite"/>
+                      </p:stCondLst>
+                      <p:childTnLst>
+                        <p:par>
+                          <p:cTn id="20" fill="hold">
+                            <p:stCondLst>
+                              <p:cond delay="0"/>
+                            </p:stCondLst>
+                            <p:childTnLst>
+                              <p:par>
+                                <p:cTn id="21" presetID="1" presetClass="entr" presetSubtype="0" fill="hold" nodeType="clickEffect">
+                                  <p:stCondLst>
+                                    <p:cond delay="0"/>
+                                  </p:stCondLst>
+                                  <p:childTnLst>
+                                    <p:set>
+                                      <p:cBhvr>
+                                        <p:cTn id="22" dur="1" fill="hold">
+                                          <p:stCondLst>
+                                            <p:cond delay="0"/>
+                                          </p:stCondLst>
+                                        </p:cTn>
+                                        <p:tgtEl>
+                                          <p:spTgt spid="6">
+                                            <p:txEl>
+                                              <p:pRg st="6" end="6"/>
+                                            </p:txEl>
+                                          </p:spTgt>
+                                        </p:tgtEl>
+                                        <p:attrNameLst>
+                                          <p:attrName>style.visibility</p:attrName>
+                                        </p:attrNameLst>
+                                      </p:cBhvr>
+                                      <p:to>
+                                        <p:strVal val="visible"/>
+                                      </p:to>
+                                    </p:set>
+                                  </p:childTnLst>
+                                </p:cTn>
+                              </p:par>
+                            </p:childTnLst>
+                          </p:cTn>
+                        </p:par>
+                      </p:childTnLst>
+                    </p:cTn>
+                  </p:par>
+                </p:childTnLst>
+              </p:cTn>
+              <p:prevCondLst>
+                <p:cond evt="onPrev" delay="0">
+                  <p:tgtEl>
+                    <p:sldTgt/>
+                  </p:tgtEl>
+                </p:cond>
+              </p:prevCondLst>
+              <p:nextCondLst>
+                <p:cond evt="onNext" delay="0">
+                  <p:tgtEl>
+                    <p:sldTgt/>
+                  </p:tgtEl>
+                </p:cond>
+              </p:nextCondLst>
+            </p:seq>
+          </p:childTnLst>
+        </p:cTn>
+      </p:par>
+    </p:tnLst>
+  </p:timing>
+</p:sld>
+</file>
+
+<file path=ppt/slides/slide11.xml><?xml version="1.0" encoding="utf-8"?>
+<p:sld xmlns:a="http://schemas.openxmlformats.org/drawingml/2006/main" xmlns:r="http://schemas.openxmlformats.org/officeDocument/2006/relationships" xmlns:p="http://schemas.openxmlformats.org/presentationml/2006/main">
+  <p:cSld>
+    <p:spTree>
+      <p:nvGrpSpPr>
+        <p:cNvPr id="1" name=""/>
+        <p:cNvGrpSpPr/>
+        <p:nvPr/>
+      </p:nvGrpSpPr>
+      <p:grpSpPr>
+        <a:xfrm>
+          <a:off x="0" y="0"/>
+          <a:ext cx="0" cy="0"/>
+          <a:chOff x="0" y="0"/>
+          <a:chExt cx="0" cy="0"/>
+        </a:xfrm>
+      </p:grpSpPr>
+      <p:sp>
+        <p:nvSpPr>
           <p:cNvPr id="5" name="Text Placeholder 4"/>
           <p:cNvSpPr>
             <a:spLocks noGrp="1"/>
@@ -12984,7 +13633,7 @@
                   <a:schemeClr val="bg1"/>
                 </a:solidFill>
               </a:rPr>
-              <a:t>T</a:t>
+              <a:t>V</a:t>
             </a:r>
             <a:r>
               <a:rPr lang="en-US" noProof="1"/>
@@ -13207,7 +13856,7 @@
             <a:fld id="{2BF067CD-8E6B-4360-9AA8-C5DF2A48A6D1}" type="slidenum">
               <a:rPr lang="en-US" noProof="0" smtClean="0"/>
               <a:pPr/>
-              <a:t>10</a:t>
+              <a:t>11</a:t>
             </a:fld>
             <a:endParaRPr lang="en-US" noProof="0" dirty="0"/>
           </a:p>
@@ -13476,7 +14125,118 @@
 </p:sld>
 </file>
 
-<file path=ppt/slides/slide11.xml><?xml version="1.0" encoding="utf-8"?>
+<file path=ppt/slides/slide12.xml><?xml version="1.0" encoding="utf-8"?>
+<p:sld xmlns:a="http://schemas.openxmlformats.org/drawingml/2006/main" xmlns:r="http://schemas.openxmlformats.org/officeDocument/2006/relationships" xmlns:p="http://schemas.openxmlformats.org/presentationml/2006/main">
+  <p:cSld>
+    <p:spTree>
+      <p:nvGrpSpPr>
+        <p:cNvPr id="1" name=""/>
+        <p:cNvGrpSpPr/>
+        <p:nvPr/>
+      </p:nvGrpSpPr>
+      <p:grpSpPr>
+        <a:xfrm>
+          <a:off x="0" y="0"/>
+          <a:ext cx="0" cy="0"/>
+          <a:chOff x="0" y="0"/>
+          <a:chExt cx="0" cy="0"/>
+        </a:xfrm>
+      </p:grpSpPr>
+      <p:pic>
+        <p:nvPicPr>
+          <p:cNvPr id="7" name="Picture 6"/>
+          <p:cNvPicPr>
+            <a:picLocks noChangeAspect="1"/>
+          </p:cNvPicPr>
+          <p:nvPr/>
+        </p:nvPicPr>
+        <p:blipFill>
+          <a:blip r:embed="rId2">
+            <a:extLst>
+              <a:ext uri="{28A0092B-C50C-407E-A947-70E740481C1C}">
+                <a14:useLocalDpi xmlns:a14="http://schemas.microsoft.com/office/drawing/2010/main" val="0"/>
+              </a:ext>
+            </a:extLst>
+          </a:blip>
+          <a:stretch>
+            <a:fillRect/>
+          </a:stretch>
+        </p:blipFill>
+        <p:spPr>
+          <a:xfrm>
+            <a:off x="4520334" y="1143141"/>
+            <a:ext cx="3094072" cy="2874674"/>
+          </a:xfrm>
+          <a:prstGeom prst="rect">
+            <a:avLst/>
+          </a:prstGeom>
+        </p:spPr>
+      </p:pic>
+      <p:sp>
+        <p:nvSpPr>
+          <p:cNvPr id="4" name="Title 3">
+            <a:extLst>
+              <a:ext uri="{FF2B5EF4-FFF2-40B4-BE49-F238E27FC236}">
+                <a16:creationId xmlns:a16="http://schemas.microsoft.com/office/drawing/2014/main" id="{B3BF449D-CC37-453C-BBCA-5D75DD02E382}"/>
+              </a:ext>
+            </a:extLst>
+          </p:cNvPr>
+          <p:cNvSpPr>
+            <a:spLocks noGrp="1"/>
+          </p:cNvSpPr>
+          <p:nvPr>
+            <p:ph type="title" sz="quarter" idx="10"/>
+          </p:nvPr>
+        </p:nvSpPr>
+        <p:spPr/>
+        <p:txBody>
+          <a:bodyPr/>
+          <a:lstStyle/>
+          <a:p>
+            <a:pPr>
+              <a:lnSpc>
+                <a:spcPct val="110000"/>
+              </a:lnSpc>
+              <a:buClr>
+                <a:schemeClr val="tx1"/>
+              </a:buClr>
+              <a:buSzPct val="100000"/>
+            </a:pPr>
+            <a:r>
+              <a:rPr lang="en-US" sz="5400" dirty="0">
+                <a:cs typeface="Consolas" panose="020B0609020204030204" pitchFamily="49" charset="0"/>
+              </a:rPr>
+              <a:t>Generic Methods</a:t>
+            </a:r>
+          </a:p>
+        </p:txBody>
+      </p:sp>
+    </p:spTree>
+    <p:extLst>
+      <p:ext uri="{BB962C8B-B14F-4D97-AF65-F5344CB8AC3E}">
+        <p14:creationId xmlns:p14="http://schemas.microsoft.com/office/powerpoint/2010/main" val="2271490264"/>
+      </p:ext>
+    </p:extLst>
+  </p:cSld>
+  <p:clrMapOvr>
+    <a:masterClrMapping/>
+  </p:clrMapOvr>
+  <mc:AlternateContent xmlns:mc="http://schemas.openxmlformats.org/markup-compatibility/2006" xmlns:p14="http://schemas.microsoft.com/office/powerpoint/2010/main">
+    <mc:Choice Requires="p14">
+      <p:transition spd="med" p14:dur="700" advClick="0" advTm="5000">
+        <p:fade/>
+      </p:transition>
+    </mc:Choice>
+    <mc:Fallback xmlns="">
+      <p:transition spd="med" advClick="0" advTm="5000">
+        <p:fade/>
+      </p:transition>
+    </mc:Fallback>
+  </mc:AlternateContent>
+</p:sld>
+</file>
+
+<file path=ppt/slides/slide13.xml><?xml version="1.0" encoding="utf-8"?>
 <p:sld xmlns:a="http://schemas.openxmlformats.org/drawingml/2006/main" xmlns:r="http://schemas.openxmlformats.org/officeDocument/2006/relationships" xmlns:p="http://schemas.openxmlformats.org/presentationml/2006/main">
   <p:cSld>
     <p:spTree>
@@ -13943,7 +14703,7 @@
             <a:fld id="{2BF067CD-8E6B-4360-9AA8-C5DF2A48A6D1}" type="slidenum">
               <a:rPr lang="en-US" noProof="0" smtClean="0"/>
               <a:pPr/>
-              <a:t>11</a:t>
+              <a:t>13</a:t>
             </a:fld>
             <a:endParaRPr lang="en-US" noProof="0" dirty="0"/>
           </a:p>
@@ -14164,7 +14924,7 @@
 </p:sld>
 </file>
 
-<file path=ppt/slides/slide12.xml><?xml version="1.0" encoding="utf-8"?>
+<file path=ppt/slides/slide14.xml><?xml version="1.0" encoding="utf-8"?>
 <p:sld xmlns:a="http://schemas.openxmlformats.org/drawingml/2006/main" xmlns:r="http://schemas.openxmlformats.org/officeDocument/2006/relationships" xmlns:p="http://schemas.openxmlformats.org/presentationml/2006/main">
   <p:cSld>
     <p:spTree>
@@ -14633,7 +15393,7 @@
             <a:fld id="{2BF067CD-8E6B-4360-9AA8-C5DF2A48A6D1}" type="slidenum">
               <a:rPr lang="en-US" noProof="0" smtClean="0"/>
               <a:pPr/>
-              <a:t>12</a:t>
+              <a:t>14</a:t>
             </a:fld>
             <a:endParaRPr lang="en-US" noProof="0" dirty="0"/>
           </a:p>
@@ -14841,7 +15601,7 @@
 </p:sld>
 </file>
 
-<file path=ppt/slides/slide13.xml><?xml version="1.0" encoding="utf-8"?>
+<file path=ppt/slides/slide15.xml><?xml version="1.0" encoding="utf-8"?>
 <p:sld xmlns:a="http://schemas.openxmlformats.org/drawingml/2006/main" xmlns:r="http://schemas.openxmlformats.org/officeDocument/2006/relationships" xmlns:p="http://schemas.openxmlformats.org/presentationml/2006/main">
   <p:cSld>
     <p:spTree>
@@ -14978,7 +15738,7 @@
           <a:p>
             <a:r>
               <a:rPr lang="en-US" dirty="0"/>
-              <a:t>It should have three public methods:</a:t>
+              <a:t>It should have two public methods:</a:t>
             </a:r>
           </a:p>
           <a:p>
@@ -15168,7 +15928,7 @@
             <a:fld id="{2BF067CD-8E6B-4360-9AA8-C5DF2A48A6D1}" type="slidenum">
               <a:rPr lang="en-US" noProof="0" smtClean="0"/>
               <a:pPr/>
-              <a:t>13</a:t>
+              <a:t>15</a:t>
             </a:fld>
             <a:endParaRPr lang="en-US" noProof="0" dirty="0"/>
           </a:p>
@@ -15456,7 +16216,7 @@
 </p:sld>
 </file>
 
-<file path=ppt/slides/slide14.xml><?xml version="1.0" encoding="utf-8"?>
+<file path=ppt/slides/slide16.xml><?xml version="1.0" encoding="utf-8"?>
 <p:sld xmlns:a="http://schemas.openxmlformats.org/drawingml/2006/main" xmlns:r="http://schemas.openxmlformats.org/officeDocument/2006/relationships" xmlns:p="http://schemas.openxmlformats.org/presentationml/2006/main">
   <p:cSld>
     <p:spTree>
@@ -16026,7 +16786,7 @@
             <a:fld id="{2BF067CD-8E6B-4360-9AA8-C5DF2A48A6D1}" type="slidenum">
               <a:rPr lang="en-US" noProof="0" smtClean="0"/>
               <a:pPr/>
-              <a:t>14</a:t>
+              <a:t>16</a:t>
             </a:fld>
             <a:endParaRPr lang="en-US" noProof="0" dirty="0"/>
           </a:p>
@@ -16358,7 +17118,7 @@
 </p:sld>
 </file>
 
-<file path=ppt/slides/slide15.xml><?xml version="1.0" encoding="utf-8"?>
+<file path=ppt/slides/slide17.xml><?xml version="1.0" encoding="utf-8"?>
 <p:sld xmlns:a="http://schemas.openxmlformats.org/drawingml/2006/main" xmlns:r="http://schemas.openxmlformats.org/officeDocument/2006/relationships" xmlns:p="http://schemas.openxmlformats.org/presentationml/2006/main">
   <p:cSld>
     <p:spTree>
@@ -16616,7 +17376,7 @@
             <a:fld id="{2BF067CD-8E6B-4360-9AA8-C5DF2A48A6D1}" type="slidenum">
               <a:rPr lang="en-US" noProof="0" smtClean="0"/>
               <a:pPr/>
-              <a:t>15</a:t>
+              <a:t>17</a:t>
             </a:fld>
             <a:endParaRPr lang="en-US" noProof="0" dirty="0"/>
           </a:p>
@@ -16775,7 +17535,7 @@
 </p:sld>
 </file>
 
-<file path=ppt/slides/slide16.xml><?xml version="1.0" encoding="utf-8"?>
+<file path=ppt/slides/slide18.xml><?xml version="1.0" encoding="utf-8"?>
 <p:sld xmlns:a="http://schemas.openxmlformats.org/drawingml/2006/main" xmlns:r="http://schemas.openxmlformats.org/officeDocument/2006/relationships" xmlns:p="http://schemas.openxmlformats.org/presentationml/2006/main">
   <p:cSld>
     <p:spTree>
@@ -17262,7 +18022,7 @@
             <a:fld id="{2BF067CD-8E6B-4360-9AA8-C5DF2A48A6D1}" type="slidenum">
               <a:rPr lang="en-US" noProof="0" smtClean="0"/>
               <a:pPr/>
-              <a:t>16</a:t>
+              <a:t>18</a:t>
             </a:fld>
             <a:endParaRPr lang="en-US" noProof="0" dirty="0"/>
           </a:p>
@@ -17501,7 +18261,7 @@
 </p:sld>
 </file>
 
-<file path=ppt/slides/slide17.xml><?xml version="1.0" encoding="utf-8"?>
+<file path=ppt/slides/slide19.xml><?xml version="1.0" encoding="utf-8"?>
 <p:sld xmlns:a="http://schemas.openxmlformats.org/drawingml/2006/main" xmlns:r="http://schemas.openxmlformats.org/officeDocument/2006/relationships" xmlns:p="http://schemas.openxmlformats.org/presentationml/2006/main">
   <p:cSld>
     <p:spTree>
@@ -17631,7 +18391,341 @@
 </p:sld>
 </file>
 
-<file path=ppt/slides/slide18.xml><?xml version="1.0" encoding="utf-8"?>
+<file path=ppt/slides/slide2.xml><?xml version="1.0" encoding="utf-8"?>
+<p:sld xmlns:a="http://schemas.openxmlformats.org/drawingml/2006/main" xmlns:r="http://schemas.openxmlformats.org/officeDocument/2006/relationships" xmlns:p="http://schemas.openxmlformats.org/presentationml/2006/main">
+  <p:cSld>
+    <p:spTree>
+      <p:nvGrpSpPr>
+        <p:cNvPr id="1" name=""/>
+        <p:cNvGrpSpPr/>
+        <p:nvPr/>
+      </p:nvGrpSpPr>
+      <p:grpSpPr>
+        <a:xfrm>
+          <a:off x="0" y="0"/>
+          <a:ext cx="0" cy="0"/>
+          <a:chOff x="0" y="0"/>
+          <a:chExt cx="0" cy="0"/>
+        </a:xfrm>
+      </p:grpSpPr>
+      <p:sp>
+        <p:nvSpPr>
+          <p:cNvPr id="3" name="Text Placeholder 2"/>
+          <p:cNvSpPr>
+            <a:spLocks noGrp="1"/>
+          </p:cNvSpPr>
+          <p:nvPr>
+            <p:ph type="body" sz="quarter" idx="10"/>
+          </p:nvPr>
+        </p:nvSpPr>
+        <p:spPr/>
+        <p:txBody>
+          <a:bodyPr/>
+          <a:lstStyle/>
+          <a:p>
+            <a:pPr marL="742950" indent="-742950">
+              <a:lnSpc>
+                <a:spcPct val="110000"/>
+              </a:lnSpc>
+              <a:buClr>
+                <a:schemeClr val="tx1"/>
+              </a:buClr>
+              <a:buSzPct val="100000"/>
+              <a:buFont typeface="+mj-lt"/>
+              <a:buAutoNum type="arabicPeriod"/>
+            </a:pPr>
+            <a:r>
+              <a:rPr lang="en-US" sz="4000" dirty="0">
+                <a:cs typeface="Consolas" panose="020B0609020204030204" pitchFamily="49" charset="0"/>
+              </a:rPr>
+              <a:t>Generics </a:t>
+            </a:r>
+          </a:p>
+          <a:p>
+            <a:pPr marL="742950" indent="-742950">
+              <a:lnSpc>
+                <a:spcPct val="110000"/>
+              </a:lnSpc>
+              <a:buClr>
+                <a:schemeClr val="tx1"/>
+              </a:buClr>
+              <a:buSzPct val="100000"/>
+              <a:buFont typeface="+mj-lt"/>
+              <a:buAutoNum type="arabicPeriod"/>
+            </a:pPr>
+            <a:r>
+              <a:rPr lang="en-US" sz="4000" dirty="0">
+                <a:cs typeface="Consolas" panose="020B0609020204030204" pitchFamily="49" charset="0"/>
+              </a:rPr>
+              <a:t>Generic Classes</a:t>
+            </a:r>
+          </a:p>
+          <a:p>
+            <a:pPr marL="742950" indent="-742950">
+              <a:lnSpc>
+                <a:spcPct val="110000"/>
+              </a:lnSpc>
+              <a:buClr>
+                <a:schemeClr val="tx1"/>
+              </a:buClr>
+              <a:buSzPct val="100000"/>
+              <a:buFont typeface="+mj-lt"/>
+              <a:buAutoNum type="arabicPeriod"/>
+            </a:pPr>
+            <a:r>
+              <a:rPr lang="en-US" sz="4000" dirty="0">
+                <a:cs typeface="Consolas" panose="020B0609020204030204" pitchFamily="49" charset="0"/>
+              </a:rPr>
+              <a:t>Generic Methods</a:t>
+            </a:r>
+          </a:p>
+          <a:p>
+            <a:pPr marL="742950" indent="-742950">
+              <a:lnSpc>
+                <a:spcPct val="110000"/>
+              </a:lnSpc>
+              <a:buClr>
+                <a:schemeClr val="tx1"/>
+              </a:buClr>
+              <a:buSzPct val="100000"/>
+              <a:buFont typeface="+mj-lt"/>
+              <a:buAutoNum type="arabicPeriod"/>
+            </a:pPr>
+            <a:r>
+              <a:rPr lang="en-US" sz="4000" dirty="0">
+                <a:cs typeface="Consolas" panose="020B0609020204030204" pitchFamily="49" charset="0"/>
+              </a:rPr>
+              <a:t>Generic Constraints</a:t>
+            </a:r>
+          </a:p>
+        </p:txBody>
+      </p:sp>
+      <p:sp>
+        <p:nvSpPr>
+          <p:cNvPr id="423938" name="Rectangle 2"/>
+          <p:cNvSpPr>
+            <a:spLocks noGrp="1" noChangeArrowheads="1"/>
+          </p:cNvSpPr>
+          <p:nvPr>
+            <p:ph type="title"/>
+          </p:nvPr>
+        </p:nvSpPr>
+        <p:spPr/>
+        <p:txBody>
+          <a:bodyPr/>
+          <a:lstStyle/>
+          <a:p>
+            <a:r>
+              <a:rPr lang="en-US"/>
+              <a:t>Table of Contents</a:t>
+            </a:r>
+            <a:endParaRPr lang="bg-BG" dirty="0"/>
+          </a:p>
+        </p:txBody>
+      </p:sp>
+    </p:spTree>
+    <p:extLst>
+      <p:ext uri="{BB962C8B-B14F-4D97-AF65-F5344CB8AC3E}">
+        <p14:creationId xmlns:p14="http://schemas.microsoft.com/office/powerpoint/2010/main" val="1617540308"/>
+      </p:ext>
+    </p:extLst>
+  </p:cSld>
+  <p:clrMapOvr>
+    <a:masterClrMapping/>
+  </p:clrMapOvr>
+  <mc:AlternateContent xmlns:mc="http://schemas.openxmlformats.org/markup-compatibility/2006" xmlns:p14="http://schemas.microsoft.com/office/powerpoint/2010/main">
+    <mc:Choice Requires="p14">
+      <p:transition spd="med" p14:dur="700">
+        <p:fade/>
+      </p:transition>
+    </mc:Choice>
+    <mc:Fallback xmlns="">
+      <p:transition spd="med">
+        <p:fade/>
+      </p:transition>
+    </mc:Fallback>
+  </mc:AlternateContent>
+  <p:timing>
+    <p:tnLst>
+      <p:par>
+        <p:cTn id="1" dur="indefinite" restart="never" nodeType="tmRoot">
+          <p:childTnLst>
+            <p:seq concurrent="1" nextAc="seek">
+              <p:cTn id="2" dur="indefinite" nodeType="mainSeq">
+                <p:childTnLst>
+                  <p:par>
+                    <p:cTn id="3" fill="hold">
+                      <p:stCondLst>
+                        <p:cond delay="indefinite"/>
+                      </p:stCondLst>
+                      <p:childTnLst>
+                        <p:par>
+                          <p:cTn id="4" fill="hold">
+                            <p:stCondLst>
+                              <p:cond delay="0"/>
+                            </p:stCondLst>
+                            <p:childTnLst>
+                              <p:par>
+                                <p:cTn id="5" presetID="1" presetClass="entr" presetSubtype="0" fill="hold" nodeType="clickEffect">
+                                  <p:stCondLst>
+                                    <p:cond delay="0"/>
+                                  </p:stCondLst>
+                                  <p:childTnLst>
+                                    <p:set>
+                                      <p:cBhvr>
+                                        <p:cTn id="6" dur="1" fill="hold">
+                                          <p:stCondLst>
+                                            <p:cond delay="0"/>
+                                          </p:stCondLst>
+                                        </p:cTn>
+                                        <p:tgtEl>
+                                          <p:spTgt spid="3">
+                                            <p:txEl>
+                                              <p:pRg st="1" end="1"/>
+                                            </p:txEl>
+                                          </p:spTgt>
+                                        </p:tgtEl>
+                                        <p:attrNameLst>
+                                          <p:attrName>style.visibility</p:attrName>
+                                        </p:attrNameLst>
+                                      </p:cBhvr>
+                                      <p:to>
+                                        <p:strVal val="visible"/>
+                                      </p:to>
+                                    </p:set>
+                                  </p:childTnLst>
+                                </p:cTn>
+                              </p:par>
+                            </p:childTnLst>
+                          </p:cTn>
+                        </p:par>
+                      </p:childTnLst>
+                    </p:cTn>
+                  </p:par>
+                  <p:par>
+                    <p:cTn id="7" fill="hold">
+                      <p:stCondLst>
+                        <p:cond delay="indefinite"/>
+                      </p:stCondLst>
+                      <p:childTnLst>
+                        <p:par>
+                          <p:cTn id="8" fill="hold">
+                            <p:stCondLst>
+                              <p:cond delay="0"/>
+                            </p:stCondLst>
+                            <p:childTnLst>
+                              <p:par>
+                                <p:cTn id="9" presetID="1" presetClass="entr" presetSubtype="0" fill="hold" nodeType="clickEffect">
+                                  <p:stCondLst>
+                                    <p:cond delay="0"/>
+                                  </p:stCondLst>
+                                  <p:childTnLst>
+                                    <p:set>
+                                      <p:cBhvr>
+                                        <p:cTn id="10" dur="1" fill="hold">
+                                          <p:stCondLst>
+                                            <p:cond delay="0"/>
+                                          </p:stCondLst>
+                                        </p:cTn>
+                                        <p:tgtEl>
+                                          <p:spTgt spid="3">
+                                            <p:txEl>
+                                              <p:pRg st="2" end="2"/>
+                                            </p:txEl>
+                                          </p:spTgt>
+                                        </p:tgtEl>
+                                        <p:attrNameLst>
+                                          <p:attrName>style.visibility</p:attrName>
+                                        </p:attrNameLst>
+                                      </p:cBhvr>
+                                      <p:to>
+                                        <p:strVal val="visible"/>
+                                      </p:to>
+                                    </p:set>
+                                  </p:childTnLst>
+                                </p:cTn>
+                              </p:par>
+                            </p:childTnLst>
+                          </p:cTn>
+                        </p:par>
+                      </p:childTnLst>
+                    </p:cTn>
+                  </p:par>
+                  <p:par>
+                    <p:cTn id="11" fill="hold">
+                      <p:stCondLst>
+                        <p:cond delay="indefinite"/>
+                      </p:stCondLst>
+                      <p:childTnLst>
+                        <p:par>
+                          <p:cTn id="12" fill="hold">
+                            <p:stCondLst>
+                              <p:cond delay="0"/>
+                            </p:stCondLst>
+                            <p:childTnLst>
+                              <p:par>
+                                <p:cTn id="13" presetID="1" presetClass="entr" presetSubtype="0" fill="hold" nodeType="clickEffect">
+                                  <p:stCondLst>
+                                    <p:cond delay="0"/>
+                                  </p:stCondLst>
+                                  <p:childTnLst>
+                                    <p:set>
+                                      <p:cBhvr>
+                                        <p:cTn id="14" dur="1" fill="hold">
+                                          <p:stCondLst>
+                                            <p:cond delay="0"/>
+                                          </p:stCondLst>
+                                        </p:cTn>
+                                        <p:tgtEl>
+                                          <p:spTgt spid="3">
+                                            <p:txEl>
+                                              <p:pRg st="3" end="3"/>
+                                            </p:txEl>
+                                          </p:spTgt>
+                                        </p:tgtEl>
+                                        <p:attrNameLst>
+                                          <p:attrName>style.visibility</p:attrName>
+                                        </p:attrNameLst>
+                                      </p:cBhvr>
+                                      <p:to>
+                                        <p:strVal val="visible"/>
+                                      </p:to>
+                                    </p:set>
+                                  </p:childTnLst>
+                                </p:cTn>
+                              </p:par>
+                            </p:childTnLst>
+                          </p:cTn>
+                        </p:par>
+                      </p:childTnLst>
+                    </p:cTn>
+                  </p:par>
+                </p:childTnLst>
+              </p:cTn>
+              <p:prevCondLst>
+                <p:cond evt="onPrev" delay="0">
+                  <p:tgtEl>
+                    <p:sldTgt/>
+                  </p:tgtEl>
+                </p:cond>
+              </p:prevCondLst>
+              <p:nextCondLst>
+                <p:cond evt="onNext" delay="0">
+                  <p:tgtEl>
+                    <p:sldTgt/>
+                  </p:tgtEl>
+                </p:cond>
+              </p:nextCondLst>
+            </p:seq>
+          </p:childTnLst>
+        </p:cTn>
+      </p:par>
+    </p:tnLst>
+  </p:timing>
+</p:sld>
+</file>
+
+<file path=ppt/slides/slide20.xml><?xml version="1.0" encoding="utf-8"?>
 <p:sld xmlns:a="http://schemas.openxmlformats.org/drawingml/2006/main" xmlns:r="http://schemas.openxmlformats.org/officeDocument/2006/relationships" xmlns:p="http://schemas.openxmlformats.org/presentationml/2006/main">
   <p:cSld>
     <p:spTree>
@@ -18029,7 +19123,7 @@
             <a:fld id="{2BF067CD-8E6B-4360-9AA8-C5DF2A48A6D1}" type="slidenum">
               <a:rPr lang="en-US" noProof="0" smtClean="0"/>
               <a:pPr/>
-              <a:t>18</a:t>
+              <a:t>20</a:t>
             </a:fld>
             <a:endParaRPr lang="en-US" noProof="0" dirty="0"/>
           </a:p>
@@ -18277,7 +19371,7 @@
 </p:sld>
 </file>
 
-<file path=ppt/slides/slide19.xml><?xml version="1.0" encoding="utf-8"?>
+<file path=ppt/slides/slide21.xml><?xml version="1.0" encoding="utf-8"?>
 <p:sld xmlns:a="http://schemas.openxmlformats.org/drawingml/2006/main" xmlns:r="http://schemas.openxmlformats.org/officeDocument/2006/relationships" xmlns:p="http://schemas.openxmlformats.org/presentationml/2006/main">
   <p:cSld>
     <p:spTree>
@@ -18600,7 +19694,7 @@
             <a:fld id="{2BF067CD-8E6B-4360-9AA8-C5DF2A48A6D1}" type="slidenum">
               <a:rPr lang="en-US" noProof="0" smtClean="0"/>
               <a:pPr/>
-              <a:t>19</a:t>
+              <a:t>21</a:t>
             </a:fld>
             <a:endParaRPr lang="en-US" noProof="0" dirty="0"/>
           </a:p>
@@ -18710,341 +19804,7 @@
 </p:sld>
 </file>
 
-<file path=ppt/slides/slide2.xml><?xml version="1.0" encoding="utf-8"?>
-<p:sld xmlns:a="http://schemas.openxmlformats.org/drawingml/2006/main" xmlns:r="http://schemas.openxmlformats.org/officeDocument/2006/relationships" xmlns:p="http://schemas.openxmlformats.org/presentationml/2006/main">
-  <p:cSld>
-    <p:spTree>
-      <p:nvGrpSpPr>
-        <p:cNvPr id="1" name=""/>
-        <p:cNvGrpSpPr/>
-        <p:nvPr/>
-      </p:nvGrpSpPr>
-      <p:grpSpPr>
-        <a:xfrm>
-          <a:off x="0" y="0"/>
-          <a:ext cx="0" cy="0"/>
-          <a:chOff x="0" y="0"/>
-          <a:chExt cx="0" cy="0"/>
-        </a:xfrm>
-      </p:grpSpPr>
-      <p:sp>
-        <p:nvSpPr>
-          <p:cNvPr id="3" name="Text Placeholder 2"/>
-          <p:cNvSpPr>
-            <a:spLocks noGrp="1"/>
-          </p:cNvSpPr>
-          <p:nvPr>
-            <p:ph type="body" sz="quarter" idx="10"/>
-          </p:nvPr>
-        </p:nvSpPr>
-        <p:spPr/>
-        <p:txBody>
-          <a:bodyPr/>
-          <a:lstStyle/>
-          <a:p>
-            <a:pPr marL="742950" indent="-742950">
-              <a:lnSpc>
-                <a:spcPct val="110000"/>
-              </a:lnSpc>
-              <a:buClr>
-                <a:schemeClr val="tx1"/>
-              </a:buClr>
-              <a:buSzPct val="100000"/>
-              <a:buFont typeface="+mj-lt"/>
-              <a:buAutoNum type="arabicPeriod"/>
-            </a:pPr>
-            <a:r>
-              <a:rPr lang="en-US" sz="4000" dirty="0">
-                <a:cs typeface="Consolas" panose="020B0609020204030204" pitchFamily="49" charset="0"/>
-              </a:rPr>
-              <a:t>Generics </a:t>
-            </a:r>
-          </a:p>
-          <a:p>
-            <a:pPr marL="742950" indent="-742950">
-              <a:lnSpc>
-                <a:spcPct val="110000"/>
-              </a:lnSpc>
-              <a:buClr>
-                <a:schemeClr val="tx1"/>
-              </a:buClr>
-              <a:buSzPct val="100000"/>
-              <a:buFont typeface="+mj-lt"/>
-              <a:buAutoNum type="arabicPeriod"/>
-            </a:pPr>
-            <a:r>
-              <a:rPr lang="en-US" sz="4000" dirty="0">
-                <a:cs typeface="Consolas" panose="020B0609020204030204" pitchFamily="49" charset="0"/>
-              </a:rPr>
-              <a:t>Generic Classes</a:t>
-            </a:r>
-          </a:p>
-          <a:p>
-            <a:pPr marL="742950" indent="-742950">
-              <a:lnSpc>
-                <a:spcPct val="110000"/>
-              </a:lnSpc>
-              <a:buClr>
-                <a:schemeClr val="tx1"/>
-              </a:buClr>
-              <a:buSzPct val="100000"/>
-              <a:buFont typeface="+mj-lt"/>
-              <a:buAutoNum type="arabicPeriod"/>
-            </a:pPr>
-            <a:r>
-              <a:rPr lang="en-US" sz="4000" dirty="0">
-                <a:cs typeface="Consolas" panose="020B0609020204030204" pitchFamily="49" charset="0"/>
-              </a:rPr>
-              <a:t>Generic Methods</a:t>
-            </a:r>
-          </a:p>
-          <a:p>
-            <a:pPr marL="742950" indent="-742950">
-              <a:lnSpc>
-                <a:spcPct val="110000"/>
-              </a:lnSpc>
-              <a:buClr>
-                <a:schemeClr val="tx1"/>
-              </a:buClr>
-              <a:buSzPct val="100000"/>
-              <a:buFont typeface="+mj-lt"/>
-              <a:buAutoNum type="arabicPeriod"/>
-            </a:pPr>
-            <a:r>
-              <a:rPr lang="en-US" sz="4000" dirty="0">
-                <a:cs typeface="Consolas" panose="020B0609020204030204" pitchFamily="49" charset="0"/>
-              </a:rPr>
-              <a:t>Generic Constraints</a:t>
-            </a:r>
-          </a:p>
-        </p:txBody>
-      </p:sp>
-      <p:sp>
-        <p:nvSpPr>
-          <p:cNvPr id="423938" name="Rectangle 2"/>
-          <p:cNvSpPr>
-            <a:spLocks noGrp="1" noChangeArrowheads="1"/>
-          </p:cNvSpPr>
-          <p:nvPr>
-            <p:ph type="title"/>
-          </p:nvPr>
-        </p:nvSpPr>
-        <p:spPr/>
-        <p:txBody>
-          <a:bodyPr/>
-          <a:lstStyle/>
-          <a:p>
-            <a:r>
-              <a:rPr lang="en-US"/>
-              <a:t>Table of Contents</a:t>
-            </a:r>
-            <a:endParaRPr lang="bg-BG" dirty="0"/>
-          </a:p>
-        </p:txBody>
-      </p:sp>
-    </p:spTree>
-    <p:extLst>
-      <p:ext uri="{BB962C8B-B14F-4D97-AF65-F5344CB8AC3E}">
-        <p14:creationId xmlns:p14="http://schemas.microsoft.com/office/powerpoint/2010/main" val="1617540308"/>
-      </p:ext>
-    </p:extLst>
-  </p:cSld>
-  <p:clrMapOvr>
-    <a:masterClrMapping/>
-  </p:clrMapOvr>
-  <mc:AlternateContent xmlns:mc="http://schemas.openxmlformats.org/markup-compatibility/2006" xmlns:p14="http://schemas.microsoft.com/office/powerpoint/2010/main">
-    <mc:Choice Requires="p14">
-      <p:transition spd="med" p14:dur="700">
-        <p:fade/>
-      </p:transition>
-    </mc:Choice>
-    <mc:Fallback xmlns="">
-      <p:transition spd="med">
-        <p:fade/>
-      </p:transition>
-    </mc:Fallback>
-  </mc:AlternateContent>
-  <p:timing>
-    <p:tnLst>
-      <p:par>
-        <p:cTn id="1" dur="indefinite" restart="never" nodeType="tmRoot">
-          <p:childTnLst>
-            <p:seq concurrent="1" nextAc="seek">
-              <p:cTn id="2" dur="indefinite" nodeType="mainSeq">
-                <p:childTnLst>
-                  <p:par>
-                    <p:cTn id="3" fill="hold">
-                      <p:stCondLst>
-                        <p:cond delay="indefinite"/>
-                      </p:stCondLst>
-                      <p:childTnLst>
-                        <p:par>
-                          <p:cTn id="4" fill="hold">
-                            <p:stCondLst>
-                              <p:cond delay="0"/>
-                            </p:stCondLst>
-                            <p:childTnLst>
-                              <p:par>
-                                <p:cTn id="5" presetID="1" presetClass="entr" presetSubtype="0" fill="hold" nodeType="clickEffect">
-                                  <p:stCondLst>
-                                    <p:cond delay="0"/>
-                                  </p:stCondLst>
-                                  <p:childTnLst>
-                                    <p:set>
-                                      <p:cBhvr>
-                                        <p:cTn id="6" dur="1" fill="hold">
-                                          <p:stCondLst>
-                                            <p:cond delay="0"/>
-                                          </p:stCondLst>
-                                        </p:cTn>
-                                        <p:tgtEl>
-                                          <p:spTgt spid="3">
-                                            <p:txEl>
-                                              <p:pRg st="1" end="1"/>
-                                            </p:txEl>
-                                          </p:spTgt>
-                                        </p:tgtEl>
-                                        <p:attrNameLst>
-                                          <p:attrName>style.visibility</p:attrName>
-                                        </p:attrNameLst>
-                                      </p:cBhvr>
-                                      <p:to>
-                                        <p:strVal val="visible"/>
-                                      </p:to>
-                                    </p:set>
-                                  </p:childTnLst>
-                                </p:cTn>
-                              </p:par>
-                            </p:childTnLst>
-                          </p:cTn>
-                        </p:par>
-                      </p:childTnLst>
-                    </p:cTn>
-                  </p:par>
-                  <p:par>
-                    <p:cTn id="7" fill="hold">
-                      <p:stCondLst>
-                        <p:cond delay="indefinite"/>
-                      </p:stCondLst>
-                      <p:childTnLst>
-                        <p:par>
-                          <p:cTn id="8" fill="hold">
-                            <p:stCondLst>
-                              <p:cond delay="0"/>
-                            </p:stCondLst>
-                            <p:childTnLst>
-                              <p:par>
-                                <p:cTn id="9" presetID="1" presetClass="entr" presetSubtype="0" fill="hold" nodeType="clickEffect">
-                                  <p:stCondLst>
-                                    <p:cond delay="0"/>
-                                  </p:stCondLst>
-                                  <p:childTnLst>
-                                    <p:set>
-                                      <p:cBhvr>
-                                        <p:cTn id="10" dur="1" fill="hold">
-                                          <p:stCondLst>
-                                            <p:cond delay="0"/>
-                                          </p:stCondLst>
-                                        </p:cTn>
-                                        <p:tgtEl>
-                                          <p:spTgt spid="3">
-                                            <p:txEl>
-                                              <p:pRg st="2" end="2"/>
-                                            </p:txEl>
-                                          </p:spTgt>
-                                        </p:tgtEl>
-                                        <p:attrNameLst>
-                                          <p:attrName>style.visibility</p:attrName>
-                                        </p:attrNameLst>
-                                      </p:cBhvr>
-                                      <p:to>
-                                        <p:strVal val="visible"/>
-                                      </p:to>
-                                    </p:set>
-                                  </p:childTnLst>
-                                </p:cTn>
-                              </p:par>
-                            </p:childTnLst>
-                          </p:cTn>
-                        </p:par>
-                      </p:childTnLst>
-                    </p:cTn>
-                  </p:par>
-                  <p:par>
-                    <p:cTn id="11" fill="hold">
-                      <p:stCondLst>
-                        <p:cond delay="indefinite"/>
-                      </p:stCondLst>
-                      <p:childTnLst>
-                        <p:par>
-                          <p:cTn id="12" fill="hold">
-                            <p:stCondLst>
-                              <p:cond delay="0"/>
-                            </p:stCondLst>
-                            <p:childTnLst>
-                              <p:par>
-                                <p:cTn id="13" presetID="1" presetClass="entr" presetSubtype="0" fill="hold" nodeType="clickEffect">
-                                  <p:stCondLst>
-                                    <p:cond delay="0"/>
-                                  </p:stCondLst>
-                                  <p:childTnLst>
-                                    <p:set>
-                                      <p:cBhvr>
-                                        <p:cTn id="14" dur="1" fill="hold">
-                                          <p:stCondLst>
-                                            <p:cond delay="0"/>
-                                          </p:stCondLst>
-                                        </p:cTn>
-                                        <p:tgtEl>
-                                          <p:spTgt spid="3">
-                                            <p:txEl>
-                                              <p:pRg st="3" end="3"/>
-                                            </p:txEl>
-                                          </p:spTgt>
-                                        </p:tgtEl>
-                                        <p:attrNameLst>
-                                          <p:attrName>style.visibility</p:attrName>
-                                        </p:attrNameLst>
-                                      </p:cBhvr>
-                                      <p:to>
-                                        <p:strVal val="visible"/>
-                                      </p:to>
-                                    </p:set>
-                                  </p:childTnLst>
-                                </p:cTn>
-                              </p:par>
-                            </p:childTnLst>
-                          </p:cTn>
-                        </p:par>
-                      </p:childTnLst>
-                    </p:cTn>
-                  </p:par>
-                </p:childTnLst>
-              </p:cTn>
-              <p:prevCondLst>
-                <p:cond evt="onPrev" delay="0">
-                  <p:tgtEl>
-                    <p:sldTgt/>
-                  </p:tgtEl>
-                </p:cond>
-              </p:prevCondLst>
-              <p:nextCondLst>
-                <p:cond evt="onNext" delay="0">
-                  <p:tgtEl>
-                    <p:sldTgt/>
-                  </p:tgtEl>
-                </p:cond>
-              </p:nextCondLst>
-            </p:seq>
-          </p:childTnLst>
-        </p:cTn>
-      </p:par>
-    </p:tnLst>
-  </p:timing>
-</p:sld>
-</file>
-
-<file path=ppt/slides/slide20.xml><?xml version="1.0" encoding="utf-8"?>
+<file path=ppt/slides/slide22.xml><?xml version="1.0" encoding="utf-8"?>
 <p:sld xmlns:a="http://schemas.openxmlformats.org/drawingml/2006/main" xmlns:r="http://schemas.openxmlformats.org/officeDocument/2006/relationships" xmlns:p="http://schemas.openxmlformats.org/presentationml/2006/main">
   <p:cSld>
     <p:spTree>
@@ -19339,7 +20099,7 @@
             <a:fld id="{2BF067CD-8E6B-4360-9AA8-C5DF2A48A6D1}" type="slidenum">
               <a:rPr lang="en-US" noProof="0" smtClean="0"/>
               <a:pPr/>
-              <a:t>20</a:t>
+              <a:t>22</a:t>
             </a:fld>
             <a:endParaRPr lang="en-US" noProof="0" dirty="0"/>
           </a:p>
@@ -19498,7 +20258,7 @@
 </p:sld>
 </file>
 
-<file path=ppt/slides/slide21.xml><?xml version="1.0" encoding="utf-8"?>
+<file path=ppt/slides/slide23.xml><?xml version="1.0" encoding="utf-8"?>
 <p:sld xmlns:a="http://schemas.openxmlformats.org/drawingml/2006/main" xmlns:r="http://schemas.openxmlformats.org/officeDocument/2006/relationships" xmlns:p="http://schemas.openxmlformats.org/presentationml/2006/main">
   <p:cSld>
     <p:spTree>
@@ -19834,7 +20594,7 @@
             <a:fld id="{2BF067CD-8E6B-4360-9AA8-C5DF2A48A6D1}" type="slidenum">
               <a:rPr lang="en-US" noProof="0" smtClean="0"/>
               <a:pPr/>
-              <a:t>21</a:t>
+              <a:t>23</a:t>
             </a:fld>
             <a:endParaRPr lang="en-US" noProof="0" dirty="0"/>
           </a:p>
@@ -19944,7 +20704,7 @@
 </p:sld>
 </file>
 
-<file path=ppt/slides/slide22.xml><?xml version="1.0" encoding="utf-8"?>
+<file path=ppt/slides/slide24.xml><?xml version="1.0" encoding="utf-8"?>
 <p:sld xmlns:a="http://schemas.openxmlformats.org/drawingml/2006/main" xmlns:r="http://schemas.openxmlformats.org/officeDocument/2006/relationships" xmlns:p="http://schemas.openxmlformats.org/presentationml/2006/main">
   <p:cSld>
     <p:spTree>
@@ -20409,7 +21169,7 @@
             <a:fld id="{2BF067CD-8E6B-4360-9AA8-C5DF2A48A6D1}" type="slidenum">
               <a:rPr lang="en-US" noProof="0" smtClean="0"/>
               <a:pPr/>
-              <a:t>22</a:t>
+              <a:t>24</a:t>
             </a:fld>
             <a:endParaRPr lang="en-US" noProof="0" dirty="0"/>
           </a:p>
@@ -20568,7 +21328,7 @@
 </p:sld>
 </file>
 
-<file path=ppt/slides/slide23.xml><?xml version="1.0" encoding="utf-8"?>
+<file path=ppt/slides/slide25.xml><?xml version="1.0" encoding="utf-8"?>
 <p:sld xmlns:a="http://schemas.openxmlformats.org/drawingml/2006/main" xmlns:r="http://schemas.openxmlformats.org/officeDocument/2006/relationships" xmlns:p="http://schemas.openxmlformats.org/presentationml/2006/main">
   <p:cSld>
     <p:spTree>
@@ -20876,7 +21636,7 @@
             <a:fld id="{2BF067CD-8E6B-4360-9AA8-C5DF2A48A6D1}" type="slidenum">
               <a:rPr lang="en-US" noProof="0" smtClean="0"/>
               <a:pPr/>
-              <a:t>23</a:t>
+              <a:t>25</a:t>
             </a:fld>
             <a:endParaRPr lang="en-US" noProof="0" dirty="0"/>
           </a:p>
@@ -20986,7 +21746,7 @@
 </p:sld>
 </file>
 
-<file path=ppt/slides/slide24.xml><?xml version="1.0" encoding="utf-8"?>
+<file path=ppt/slides/slide26.xml><?xml version="1.0" encoding="utf-8"?>
 <p:sld xmlns:a="http://schemas.openxmlformats.org/drawingml/2006/main" xmlns:r="http://schemas.openxmlformats.org/officeDocument/2006/relationships" xmlns:p="http://schemas.openxmlformats.org/presentationml/2006/main">
   <p:cSld>
     <p:spTree>
@@ -21280,7 +22040,7 @@
             <a:fld id="{2BF067CD-8E6B-4360-9AA8-C5DF2A48A6D1}" type="slidenum">
               <a:rPr lang="en-US" noProof="0" smtClean="0"/>
               <a:pPr/>
-              <a:t>24</a:t>
+              <a:t>26</a:t>
             </a:fld>
             <a:endParaRPr lang="en-US" noProof="0" dirty="0"/>
           </a:p>
@@ -21519,7 +22279,7 @@
 </p:sld>
 </file>
 
-<file path=ppt/slides/slide25.xml><?xml version="1.0" encoding="utf-8"?>
+<file path=ppt/slides/slide27.xml><?xml version="1.0" encoding="utf-8"?>
 <p:sld xmlns:a="http://schemas.openxmlformats.org/drawingml/2006/main" xmlns:r="http://schemas.openxmlformats.org/officeDocument/2006/relationships" xmlns:p="http://schemas.openxmlformats.org/presentationml/2006/main">
   <p:cSld>
     <p:spTree>
@@ -21886,7 +22646,7 @@
                 <a:latin typeface="Consolas" pitchFamily="49" charset="0"/>
                 <a:cs typeface="Consolas" pitchFamily="49" charset="0"/>
               </a:rPr>
-              <a:t>Scale</a:t>
+              <a:t>EqualityScale</a:t>
             </a:r>
             <a:r>
               <a:rPr lang="en-US" sz="2400" b="1" noProof="1">
@@ -22253,7 +23013,7 @@
             <a:fld id="{2BF067CD-8E6B-4360-9AA8-C5DF2A48A6D1}" type="slidenum">
               <a:rPr lang="en-US" noProof="0" smtClean="0"/>
               <a:pPr/>
-              <a:t>25</a:t>
+              <a:t>27</a:t>
             </a:fld>
             <a:endParaRPr lang="en-US" noProof="0" dirty="0"/>
           </a:p>
@@ -22714,7 +23474,7 @@
 </p:sld>
 </file>
 
-<file path=ppt/slides/slide26.xml><?xml version="1.0" encoding="utf-8"?>
+<file path=ppt/slides/slide28.xml><?xml version="1.0" encoding="utf-8"?>
 <p:sld xmlns:a="http://schemas.openxmlformats.org/drawingml/2006/main" xmlns:r="http://schemas.openxmlformats.org/officeDocument/2006/relationships" xmlns:p="http://schemas.openxmlformats.org/presentationml/2006/main">
   <p:cSld>
     <p:spTree>
@@ -23575,7 +24335,7 @@
             <a:fld id="{2BF067CD-8E6B-4360-9AA8-C5DF2A48A6D1}" type="slidenum">
               <a:rPr lang="en-US" noProof="0" smtClean="0"/>
               <a:pPr/>
-              <a:t>26</a:t>
+              <a:t>28</a:t>
             </a:fld>
             <a:endParaRPr lang="en-US" noProof="0" dirty="0"/>
           </a:p>
@@ -23783,7 +24543,7 @@
 </p:sld>
 </file>
 
-<file path=ppt/slides/slide27.xml><?xml version="1.0" encoding="utf-8"?>
+<file path=ppt/slides/slide29.xml><?xml version="1.0" encoding="utf-8"?>
 <p:sld xmlns:a="http://schemas.openxmlformats.org/drawingml/2006/main" xmlns:r="http://schemas.openxmlformats.org/officeDocument/2006/relationships" xmlns:p="http://schemas.openxmlformats.org/presentationml/2006/main">
   <p:cSld>
     <p:spTree>
@@ -23854,7 +24614,471 @@
 </p:sld>
 </file>
 
-<file path=ppt/slides/slide28.xml><?xml version="1.0" encoding="utf-8"?>
+<file path=ppt/slides/slide3.xml><?xml version="1.0" encoding="utf-8"?>
+<p:sld xmlns:a="http://schemas.openxmlformats.org/drawingml/2006/main" xmlns:r="http://schemas.openxmlformats.org/officeDocument/2006/relationships" xmlns:p="http://schemas.openxmlformats.org/presentationml/2006/main">
+  <p:cSld>
+    <p:spTree>
+      <p:nvGrpSpPr>
+        <p:cNvPr id="1" name=""/>
+        <p:cNvGrpSpPr/>
+        <p:nvPr/>
+      </p:nvGrpSpPr>
+      <p:grpSpPr>
+        <a:xfrm>
+          <a:off x="0" y="0"/>
+          <a:ext cx="0" cy="0"/>
+          <a:chOff x="0" y="0"/>
+          <a:chExt cx="0" cy="0"/>
+        </a:xfrm>
+      </p:grpSpPr>
+      <p:sp>
+        <p:nvSpPr>
+          <p:cNvPr id="4" name="Title 3"/>
+          <p:cNvSpPr>
+            <a:spLocks noGrp="1"/>
+          </p:cNvSpPr>
+          <p:nvPr>
+            <p:ph type="title"/>
+          </p:nvPr>
+        </p:nvSpPr>
+        <p:spPr/>
+        <p:txBody>
+          <a:bodyPr/>
+          <a:lstStyle/>
+          <a:p>
+            <a:r>
+              <a:rPr lang="en-US"/>
+              <a:t>Questions</a:t>
+            </a:r>
+            <a:endParaRPr lang="en-US" dirty="0"/>
+          </a:p>
+        </p:txBody>
+      </p:sp>
+      <p:sp>
+        <p:nvSpPr>
+          <p:cNvPr id="9" name="Content Placeholder 2"/>
+          <p:cNvSpPr txBox="1">
+            <a:spLocks/>
+          </p:cNvSpPr>
+          <p:nvPr/>
+        </p:nvSpPr>
+        <p:spPr>
+          <a:xfrm>
+            <a:off x="173037" y="1347788"/>
+            <a:ext cx="11804650" cy="5373687"/>
+          </a:xfrm>
+          <a:prstGeom prst="rect">
+            <a:avLst/>
+          </a:prstGeom>
+        </p:spPr>
+        <p:txBody>
+          <a:bodyPr vert="horz" lIns="108000" tIns="36000" rIns="108000" bIns="36000" rtlCol="0">
+            <a:normAutofit/>
+          </a:bodyPr>
+          <a:lstStyle>
+            <a:lvl1pPr marL="456915" indent="-456915" algn="l" defTabSz="1218438" rtl="0" eaLnBrk="1" latinLnBrk="1" hangingPunct="1">
+              <a:lnSpc>
+                <a:spcPct val="105000"/>
+              </a:lnSpc>
+              <a:spcBef>
+                <a:spcPts val="600"/>
+              </a:spcBef>
+              <a:spcAft>
+                <a:spcPts val="600"/>
+              </a:spcAft>
+              <a:buFont typeface="Wingdings" panose="05000000000000000000" pitchFamily="2" charset="2"/>
+              <a:buChar char="§"/>
+              <a:defRPr sz="3398" kern="1200">
+                <a:solidFill>
+                  <a:schemeClr val="tx1"/>
+                </a:solidFill>
+                <a:latin typeface="+mn-lt"/>
+                <a:ea typeface="+mn-ea"/>
+                <a:cs typeface="+mn-cs"/>
+              </a:defRPr>
+            </a:lvl1pPr>
+            <a:lvl2pPr marL="989981" indent="-380762" algn="l" defTabSz="1218438" rtl="0" eaLnBrk="1" latinLnBrk="1" hangingPunct="1">
+              <a:lnSpc>
+                <a:spcPct val="105000"/>
+              </a:lnSpc>
+              <a:spcBef>
+                <a:spcPts val="600"/>
+              </a:spcBef>
+              <a:spcAft>
+                <a:spcPts val="600"/>
+              </a:spcAft>
+              <a:buFont typeface="Wingdings" panose="05000000000000000000" pitchFamily="2" charset="2"/>
+              <a:buChar char="§"/>
+              <a:defRPr sz="3198" kern="1200">
+                <a:solidFill>
+                  <a:schemeClr val="tx1"/>
+                </a:solidFill>
+                <a:latin typeface="+mn-lt"/>
+                <a:ea typeface="+mn-ea"/>
+                <a:cs typeface="+mn-cs"/>
+              </a:defRPr>
+            </a:lvl2pPr>
+            <a:lvl3pPr marL="1523048" indent="-304610" algn="l" defTabSz="1218438" rtl="0" eaLnBrk="1" latinLnBrk="1" hangingPunct="1">
+              <a:lnSpc>
+                <a:spcPct val="105000"/>
+              </a:lnSpc>
+              <a:spcBef>
+                <a:spcPts val="600"/>
+              </a:spcBef>
+              <a:spcAft>
+                <a:spcPts val="600"/>
+              </a:spcAft>
+              <a:buFont typeface="Wingdings" panose="05000000000000000000" pitchFamily="2" charset="2"/>
+              <a:buChar char="§"/>
+              <a:defRPr sz="2998" kern="1200">
+                <a:solidFill>
+                  <a:schemeClr val="tx1"/>
+                </a:solidFill>
+                <a:latin typeface="+mn-lt"/>
+                <a:ea typeface="+mn-ea"/>
+                <a:cs typeface="+mn-cs"/>
+              </a:defRPr>
+            </a:lvl3pPr>
+            <a:lvl4pPr marL="2132267" indent="-304610" algn="l" defTabSz="1218438" rtl="0" eaLnBrk="1" latinLnBrk="1" hangingPunct="1">
+              <a:lnSpc>
+                <a:spcPct val="105000"/>
+              </a:lnSpc>
+              <a:spcBef>
+                <a:spcPts val="600"/>
+              </a:spcBef>
+              <a:spcAft>
+                <a:spcPts val="600"/>
+              </a:spcAft>
+              <a:buFont typeface="Wingdings" panose="05000000000000000000" pitchFamily="2" charset="2"/>
+              <a:buChar char="§"/>
+              <a:defRPr sz="2798" kern="1200">
+                <a:solidFill>
+                  <a:schemeClr val="tx1"/>
+                </a:solidFill>
+                <a:latin typeface="+mn-lt"/>
+                <a:ea typeface="+mn-ea"/>
+                <a:cs typeface="+mn-cs"/>
+              </a:defRPr>
+            </a:lvl4pPr>
+            <a:lvl5pPr marL="2741485" indent="-304610" algn="l" defTabSz="1218438" rtl="0" eaLnBrk="1" latinLnBrk="1" hangingPunct="1">
+              <a:lnSpc>
+                <a:spcPct val="105000"/>
+              </a:lnSpc>
+              <a:spcBef>
+                <a:spcPts val="600"/>
+              </a:spcBef>
+              <a:spcAft>
+                <a:spcPts val="600"/>
+              </a:spcAft>
+              <a:buFont typeface="Wingdings" panose="05000000000000000000" pitchFamily="2" charset="2"/>
+              <a:buChar char="§"/>
+              <a:defRPr sz="2598" kern="1200">
+                <a:solidFill>
+                  <a:schemeClr val="tx1"/>
+                </a:solidFill>
+                <a:latin typeface="+mn-lt"/>
+                <a:ea typeface="+mn-ea"/>
+                <a:cs typeface="+mn-cs"/>
+              </a:defRPr>
+            </a:lvl5pPr>
+            <a:lvl6pPr marL="3350704" indent="-304610" algn="l" defTabSz="1218438" rtl="0" eaLnBrk="1" latinLnBrk="1" hangingPunct="1">
+              <a:spcBef>
+                <a:spcPct val="20000"/>
+              </a:spcBef>
+              <a:buFont typeface="Arial" pitchFamily="34" charset="0"/>
+              <a:buChar char="•"/>
+              <a:defRPr sz="2665" kern="1200">
+                <a:solidFill>
+                  <a:schemeClr val="tx1"/>
+                </a:solidFill>
+                <a:latin typeface="+mn-lt"/>
+                <a:ea typeface="+mn-ea"/>
+                <a:cs typeface="+mn-cs"/>
+              </a:defRPr>
+            </a:lvl6pPr>
+            <a:lvl7pPr marL="3959924" indent="-304610" algn="l" defTabSz="1218438" rtl="0" eaLnBrk="1" latinLnBrk="1" hangingPunct="1">
+              <a:spcBef>
+                <a:spcPct val="20000"/>
+              </a:spcBef>
+              <a:buFont typeface="Arial" pitchFamily="34" charset="0"/>
+              <a:buChar char="•"/>
+              <a:defRPr sz="2665" kern="1200">
+                <a:solidFill>
+                  <a:schemeClr val="tx1"/>
+                </a:solidFill>
+                <a:latin typeface="+mn-lt"/>
+                <a:ea typeface="+mn-ea"/>
+                <a:cs typeface="+mn-cs"/>
+              </a:defRPr>
+            </a:lvl7pPr>
+            <a:lvl8pPr marL="4569143" indent="-304610" algn="l" defTabSz="1218438" rtl="0" eaLnBrk="1" latinLnBrk="1" hangingPunct="1">
+              <a:spcBef>
+                <a:spcPct val="20000"/>
+              </a:spcBef>
+              <a:buFont typeface="Arial" pitchFamily="34" charset="0"/>
+              <a:buChar char="•"/>
+              <a:defRPr sz="2665" kern="1200">
+                <a:solidFill>
+                  <a:schemeClr val="tx1"/>
+                </a:solidFill>
+                <a:latin typeface="+mn-lt"/>
+                <a:ea typeface="+mn-ea"/>
+                <a:cs typeface="+mn-cs"/>
+              </a:defRPr>
+            </a:lvl8pPr>
+            <a:lvl9pPr marL="5178362" indent="-304610" algn="l" defTabSz="1218438" rtl="0" eaLnBrk="1" latinLnBrk="1" hangingPunct="1">
+              <a:spcBef>
+                <a:spcPct val="20000"/>
+              </a:spcBef>
+              <a:buFont typeface="Arial" pitchFamily="34" charset="0"/>
+              <a:buChar char="•"/>
+              <a:defRPr sz="2665" kern="1200">
+                <a:solidFill>
+                  <a:schemeClr val="tx1"/>
+                </a:solidFill>
+                <a:latin typeface="+mn-lt"/>
+                <a:ea typeface="+mn-ea"/>
+                <a:cs typeface="+mn-cs"/>
+              </a:defRPr>
+            </a:lvl9pPr>
+          </a:lstStyle>
+          <a:p>
+            <a:pPr marL="0" marR="0" lvl="0" indent="0" algn="ctr" defTabSz="1218438" rtl="0" eaLnBrk="1" fontAlgn="auto" latinLnBrk="1" hangingPunct="1">
+              <a:lnSpc>
+                <a:spcPct val="105000"/>
+              </a:lnSpc>
+              <a:spcBef>
+                <a:spcPts val="600"/>
+              </a:spcBef>
+              <a:spcAft>
+                <a:spcPts val="600"/>
+              </a:spcAft>
+              <a:buClrTx/>
+              <a:buSzTx/>
+              <a:buFont typeface="Wingdings" panose="05000000000000000000" pitchFamily="2" charset="2"/>
+              <a:buNone/>
+              <a:tabLst/>
+              <a:defRPr/>
+            </a:pPr>
+            <a:endParaRPr kumimoji="0" lang="bg-BG" sz="3398" b="1" i="0" u="none" strike="noStrike" kern="1200" cap="none" spc="0" normalizeH="0" baseline="0" noProof="0" dirty="0">
+              <a:ln>
+                <a:noFill/>
+              </a:ln>
+              <a:solidFill>
+                <a:srgbClr val="234465"/>
+              </a:solidFill>
+              <a:effectLst/>
+              <a:uLnTx/>
+              <a:uFillTx/>
+              <a:latin typeface="Calibri" panose="020F0502020204030204"/>
+              <a:ea typeface="+mn-ea"/>
+              <a:cs typeface="+mn-cs"/>
+            </a:endParaRPr>
+          </a:p>
+          <a:p>
+            <a:pPr marL="0" marR="0" lvl="0" indent="0" algn="ctr" defTabSz="1218438" rtl="0" eaLnBrk="1" fontAlgn="auto" latinLnBrk="1" hangingPunct="1">
+              <a:lnSpc>
+                <a:spcPct val="105000"/>
+              </a:lnSpc>
+              <a:spcBef>
+                <a:spcPts val="600"/>
+              </a:spcBef>
+              <a:spcAft>
+                <a:spcPts val="600"/>
+              </a:spcAft>
+              <a:buClrTx/>
+              <a:buSzTx/>
+              <a:buFont typeface="Wingdings" panose="05000000000000000000" pitchFamily="2" charset="2"/>
+              <a:buNone/>
+              <a:tabLst/>
+              <a:defRPr/>
+            </a:pPr>
+            <a:r>
+              <a:rPr kumimoji="0" lang="en-US" sz="7200" b="1" i="0" u="sng" strike="noStrike" kern="1200" cap="none" spc="0" normalizeH="0" baseline="0" noProof="0" dirty="0">
+                <a:ln>
+                  <a:noFill/>
+                </a:ln>
+                <a:solidFill>
+                  <a:srgbClr val="FFA000"/>
+                </a:solidFill>
+                <a:effectLst/>
+                <a:uLnTx/>
+                <a:uFillTx/>
+                <a:latin typeface="Calibri" panose="020F0502020204030204"/>
+                <a:ea typeface="+mn-ea"/>
+                <a:cs typeface="+mn-cs"/>
+              </a:rPr>
+              <a:t>sli.do</a:t>
+            </a:r>
+            <a:br>
+              <a:rPr kumimoji="0" lang="en-US" sz="6000" b="1" i="0" u="none" strike="noStrike" kern="1200" cap="none" spc="0" normalizeH="0" baseline="0" noProof="0" dirty="0">
+                <a:ln>
+                  <a:noFill/>
+                </a:ln>
+                <a:solidFill>
+                  <a:srgbClr val="234465"/>
+                </a:solidFill>
+                <a:effectLst/>
+                <a:uLnTx/>
+                <a:uFillTx/>
+                <a:latin typeface="Calibri" panose="020F0502020204030204"/>
+                <a:ea typeface="+mn-ea"/>
+                <a:cs typeface="+mn-cs"/>
+              </a:rPr>
+            </a:br>
+            <a:r>
+              <a:rPr kumimoji="0" lang="en-US" sz="11500" b="1" i="0" u="none" strike="noStrike" kern="1200" cap="none" spc="0" normalizeH="0" baseline="0" noProof="0" dirty="0">
+                <a:ln>
+                  <a:noFill/>
+                </a:ln>
+                <a:solidFill>
+                  <a:srgbClr val="234465"/>
+                </a:solidFill>
+                <a:effectLst/>
+                <a:uLnTx/>
+                <a:uFillTx/>
+                <a:latin typeface="Calibri" panose="020F0502020204030204"/>
+                <a:ea typeface="+mn-ea"/>
+                <a:cs typeface="+mn-cs"/>
+              </a:rPr>
+              <a:t>#</a:t>
+            </a:r>
+            <a:r>
+              <a:rPr kumimoji="0" lang="en-US" sz="11500" b="1" i="0" u="none" strike="noStrike" kern="1200" cap="none" spc="0" normalizeH="0" baseline="0" noProof="1">
+                <a:ln>
+                  <a:noFill/>
+                </a:ln>
+                <a:solidFill>
+                  <a:srgbClr val="234465"/>
+                </a:solidFill>
+                <a:effectLst/>
+                <a:uLnTx/>
+                <a:uFillTx/>
+                <a:latin typeface="Calibri" panose="020F0502020204030204"/>
+                <a:ea typeface="+mn-ea"/>
+                <a:cs typeface="+mn-cs"/>
+              </a:rPr>
+              <a:t>csharp</a:t>
+            </a:r>
+            <a:r>
+              <a:rPr kumimoji="0" lang="bg-BG" sz="11500" b="1" i="0" u="none" strike="noStrike" kern="1200" cap="none" spc="0" normalizeH="0" baseline="0" noProof="1">
+                <a:ln>
+                  <a:noFill/>
+                </a:ln>
+                <a:solidFill>
+                  <a:srgbClr val="234465"/>
+                </a:solidFill>
+                <a:effectLst/>
+                <a:uLnTx/>
+                <a:uFillTx/>
+                <a:latin typeface="Calibri" panose="020F0502020204030204"/>
+                <a:ea typeface="+mn-ea"/>
+                <a:cs typeface="+mn-cs"/>
+              </a:rPr>
+              <a:t>-</a:t>
+            </a:r>
+            <a:r>
+              <a:rPr kumimoji="0" lang="en-US" sz="11500" b="1" i="0" u="none" strike="noStrike" kern="1200" cap="none" spc="0" normalizeH="0" baseline="0" noProof="1">
+                <a:ln>
+                  <a:noFill/>
+                </a:ln>
+                <a:solidFill>
+                  <a:srgbClr val="234465"/>
+                </a:solidFill>
+                <a:effectLst/>
+                <a:uLnTx/>
+                <a:uFillTx/>
+                <a:latin typeface="Calibri" panose="020F0502020204030204"/>
+                <a:ea typeface="+mn-ea"/>
+                <a:cs typeface="+mn-cs"/>
+              </a:rPr>
+              <a:t>advanced</a:t>
+            </a:r>
+            <a:endParaRPr kumimoji="0" lang="en-US" sz="3398" b="0" i="0" u="none" strike="noStrike" kern="1200" cap="none" spc="0" normalizeH="0" baseline="0" noProof="1">
+              <a:ln>
+                <a:noFill/>
+              </a:ln>
+              <a:solidFill>
+                <a:srgbClr val="234465"/>
+              </a:solidFill>
+              <a:effectLst/>
+              <a:uLnTx/>
+              <a:uFillTx/>
+              <a:latin typeface="Calibri" panose="020F0502020204030204"/>
+              <a:ea typeface="+mn-ea"/>
+              <a:cs typeface="+mn-cs"/>
+            </a:endParaRPr>
+          </a:p>
+        </p:txBody>
+      </p:sp>
+      <p:sp>
+        <p:nvSpPr>
+          <p:cNvPr id="6" name="Slide Number">
+            <a:extLst>
+              <a:ext uri="{FF2B5EF4-FFF2-40B4-BE49-F238E27FC236}">
+                <a16:creationId xmlns:a16="http://schemas.microsoft.com/office/drawing/2014/main" id="{343B277F-EB76-4869-BEB4-DF5CD675D553}"/>
+              </a:ext>
+            </a:extLst>
+          </p:cNvPr>
+          <p:cNvSpPr>
+            <a:spLocks noGrp="1"/>
+          </p:cNvSpPr>
+          <p:nvPr>
+            <p:ph type="sldNum" sz="quarter" idx="5"/>
+          </p:nvPr>
+        </p:nvSpPr>
+        <p:spPr>
+          <a:xfrm>
+            <a:off x="11753030" y="6507000"/>
+            <a:ext cx="367414" cy="297000"/>
+          </a:xfrm>
+          <a:prstGeom prst="rect">
+            <a:avLst/>
+          </a:prstGeom>
+        </p:spPr>
+        <p:txBody>
+          <a:bodyPr vert="horz" lIns="91440" tIns="45720" rIns="91440" bIns="45720" rtlCol="0" anchor="b"/>
+          <a:lstStyle>
+            <a:lvl1pPr algn="r">
+              <a:defRPr sz="1000"/>
+            </a:lvl1pPr>
+          </a:lstStyle>
+          <a:p>
+            <a:fld id="{2BF067CD-8E6B-4360-9AA8-C5DF2A48A6D1}" type="slidenum">
+              <a:rPr lang="en-US" noProof="0" smtClean="0"/>
+              <a:pPr/>
+              <a:t>3</a:t>
+            </a:fld>
+            <a:endParaRPr lang="en-US" noProof="0" dirty="0"/>
+          </a:p>
+        </p:txBody>
+      </p:sp>
+    </p:spTree>
+    <p:extLst>
+      <p:ext uri="{BB962C8B-B14F-4D97-AF65-F5344CB8AC3E}">
+        <p14:creationId xmlns:p14="http://schemas.microsoft.com/office/powerpoint/2010/main" val="2457963006"/>
+      </p:ext>
+    </p:extLst>
+  </p:cSld>
+  <p:clrMapOvr>
+    <a:masterClrMapping/>
+  </p:clrMapOvr>
+  <mc:AlternateContent xmlns:mc="http://schemas.openxmlformats.org/markup-compatibility/2006" xmlns:p14="http://schemas.microsoft.com/office/powerpoint/2010/main">
+    <mc:Choice Requires="p14">
+      <p:transition spd="med" p14:dur="700" advClick="0" advTm="5000">
+        <p:fade/>
+      </p:transition>
+    </mc:Choice>
+    <mc:Fallback xmlns="">
+      <p:transition spd="med" advClick="0" advTm="5000">
+        <p:fade/>
+      </p:transition>
+    </mc:Fallback>
+  </mc:AlternateContent>
+</p:sld>
+</file>
+
+<file path=ppt/slides/slide30.xml><?xml version="1.0" encoding="utf-8"?>
 <p:sld xmlns:a="http://schemas.openxmlformats.org/drawingml/2006/main" xmlns:r="http://schemas.openxmlformats.org/officeDocument/2006/relationships" xmlns:p="http://schemas.openxmlformats.org/presentationml/2006/main">
   <p:cSld>
     <p:spTree>
@@ -24146,7 +25370,7 @@
             <a:fld id="{2BF067CD-8E6B-4360-9AA8-C5DF2A48A6D1}" type="slidenum">
               <a:rPr lang="en-US" smtClean="0"/>
               <a:pPr/>
-              <a:t>28</a:t>
+              <a:t>30</a:t>
             </a:fld>
             <a:endParaRPr lang="en-US" dirty="0"/>
           </a:p>
@@ -24173,7 +25397,7 @@
 </p:sld>
 </file>
 
-<file path=ppt/slides/slide29.xml><?xml version="1.0" encoding="utf-8"?>
+<file path=ppt/slides/slide31.xml><?xml version="1.0" encoding="utf-8"?>
 <p:sld xmlns:a="http://schemas.openxmlformats.org/drawingml/2006/main" xmlns:r="http://schemas.openxmlformats.org/officeDocument/2006/relationships" xmlns:p="http://schemas.openxmlformats.org/presentationml/2006/main">
   <p:cSld>
     <p:spTree>
@@ -24386,7 +25610,7 @@
             <a:fld id="{2BF067CD-8E6B-4360-9AA8-C5DF2A48A6D1}" type="slidenum">
               <a:rPr lang="en-US" noProof="0" smtClean="0"/>
               <a:pPr/>
-              <a:t>29</a:t>
+              <a:t>31</a:t>
             </a:fld>
             <a:endParaRPr lang="en-US" noProof="0" dirty="0"/>
           </a:p>
@@ -24408,470 +25632,6 @@
     </mc:Choice>
     <mc:Fallback xmlns="">
       <p:transition spd="slow" advClick="0" advTm="5000"/>
-    </mc:Fallback>
-  </mc:AlternateContent>
-</p:sld>
-</file>
-
-<file path=ppt/slides/slide3.xml><?xml version="1.0" encoding="utf-8"?>
-<p:sld xmlns:a="http://schemas.openxmlformats.org/drawingml/2006/main" xmlns:r="http://schemas.openxmlformats.org/officeDocument/2006/relationships" xmlns:p="http://schemas.openxmlformats.org/presentationml/2006/main">
-  <p:cSld>
-    <p:spTree>
-      <p:nvGrpSpPr>
-        <p:cNvPr id="1" name=""/>
-        <p:cNvGrpSpPr/>
-        <p:nvPr/>
-      </p:nvGrpSpPr>
-      <p:grpSpPr>
-        <a:xfrm>
-          <a:off x="0" y="0"/>
-          <a:ext cx="0" cy="0"/>
-          <a:chOff x="0" y="0"/>
-          <a:chExt cx="0" cy="0"/>
-        </a:xfrm>
-      </p:grpSpPr>
-      <p:sp>
-        <p:nvSpPr>
-          <p:cNvPr id="4" name="Title 3"/>
-          <p:cNvSpPr>
-            <a:spLocks noGrp="1"/>
-          </p:cNvSpPr>
-          <p:nvPr>
-            <p:ph type="title"/>
-          </p:nvPr>
-        </p:nvSpPr>
-        <p:spPr/>
-        <p:txBody>
-          <a:bodyPr/>
-          <a:lstStyle/>
-          <a:p>
-            <a:r>
-              <a:rPr lang="en-US"/>
-              <a:t>Questions</a:t>
-            </a:r>
-            <a:endParaRPr lang="en-US" dirty="0"/>
-          </a:p>
-        </p:txBody>
-      </p:sp>
-      <p:sp>
-        <p:nvSpPr>
-          <p:cNvPr id="9" name="Content Placeholder 2"/>
-          <p:cNvSpPr txBox="1">
-            <a:spLocks/>
-          </p:cNvSpPr>
-          <p:nvPr/>
-        </p:nvSpPr>
-        <p:spPr>
-          <a:xfrm>
-            <a:off x="173037" y="1347788"/>
-            <a:ext cx="11804650" cy="5373687"/>
-          </a:xfrm>
-          <a:prstGeom prst="rect">
-            <a:avLst/>
-          </a:prstGeom>
-        </p:spPr>
-        <p:txBody>
-          <a:bodyPr vert="horz" lIns="108000" tIns="36000" rIns="108000" bIns="36000" rtlCol="0">
-            <a:normAutofit/>
-          </a:bodyPr>
-          <a:lstStyle>
-            <a:lvl1pPr marL="456915" indent="-456915" algn="l" defTabSz="1218438" rtl="0" eaLnBrk="1" latinLnBrk="1" hangingPunct="1">
-              <a:lnSpc>
-                <a:spcPct val="105000"/>
-              </a:lnSpc>
-              <a:spcBef>
-                <a:spcPts val="600"/>
-              </a:spcBef>
-              <a:spcAft>
-                <a:spcPts val="600"/>
-              </a:spcAft>
-              <a:buFont typeface="Wingdings" panose="05000000000000000000" pitchFamily="2" charset="2"/>
-              <a:buChar char="§"/>
-              <a:defRPr sz="3398" kern="1200">
-                <a:solidFill>
-                  <a:schemeClr val="tx1"/>
-                </a:solidFill>
-                <a:latin typeface="+mn-lt"/>
-                <a:ea typeface="+mn-ea"/>
-                <a:cs typeface="+mn-cs"/>
-              </a:defRPr>
-            </a:lvl1pPr>
-            <a:lvl2pPr marL="989981" indent="-380762" algn="l" defTabSz="1218438" rtl="0" eaLnBrk="1" latinLnBrk="1" hangingPunct="1">
-              <a:lnSpc>
-                <a:spcPct val="105000"/>
-              </a:lnSpc>
-              <a:spcBef>
-                <a:spcPts val="600"/>
-              </a:spcBef>
-              <a:spcAft>
-                <a:spcPts val="600"/>
-              </a:spcAft>
-              <a:buFont typeface="Wingdings" panose="05000000000000000000" pitchFamily="2" charset="2"/>
-              <a:buChar char="§"/>
-              <a:defRPr sz="3198" kern="1200">
-                <a:solidFill>
-                  <a:schemeClr val="tx1"/>
-                </a:solidFill>
-                <a:latin typeface="+mn-lt"/>
-                <a:ea typeface="+mn-ea"/>
-                <a:cs typeface="+mn-cs"/>
-              </a:defRPr>
-            </a:lvl2pPr>
-            <a:lvl3pPr marL="1523048" indent="-304610" algn="l" defTabSz="1218438" rtl="0" eaLnBrk="1" latinLnBrk="1" hangingPunct="1">
-              <a:lnSpc>
-                <a:spcPct val="105000"/>
-              </a:lnSpc>
-              <a:spcBef>
-                <a:spcPts val="600"/>
-              </a:spcBef>
-              <a:spcAft>
-                <a:spcPts val="600"/>
-              </a:spcAft>
-              <a:buFont typeface="Wingdings" panose="05000000000000000000" pitchFamily="2" charset="2"/>
-              <a:buChar char="§"/>
-              <a:defRPr sz="2998" kern="1200">
-                <a:solidFill>
-                  <a:schemeClr val="tx1"/>
-                </a:solidFill>
-                <a:latin typeface="+mn-lt"/>
-                <a:ea typeface="+mn-ea"/>
-                <a:cs typeface="+mn-cs"/>
-              </a:defRPr>
-            </a:lvl3pPr>
-            <a:lvl4pPr marL="2132267" indent="-304610" algn="l" defTabSz="1218438" rtl="0" eaLnBrk="1" latinLnBrk="1" hangingPunct="1">
-              <a:lnSpc>
-                <a:spcPct val="105000"/>
-              </a:lnSpc>
-              <a:spcBef>
-                <a:spcPts val="600"/>
-              </a:spcBef>
-              <a:spcAft>
-                <a:spcPts val="600"/>
-              </a:spcAft>
-              <a:buFont typeface="Wingdings" panose="05000000000000000000" pitchFamily="2" charset="2"/>
-              <a:buChar char="§"/>
-              <a:defRPr sz="2798" kern="1200">
-                <a:solidFill>
-                  <a:schemeClr val="tx1"/>
-                </a:solidFill>
-                <a:latin typeface="+mn-lt"/>
-                <a:ea typeface="+mn-ea"/>
-                <a:cs typeface="+mn-cs"/>
-              </a:defRPr>
-            </a:lvl4pPr>
-            <a:lvl5pPr marL="2741485" indent="-304610" algn="l" defTabSz="1218438" rtl="0" eaLnBrk="1" latinLnBrk="1" hangingPunct="1">
-              <a:lnSpc>
-                <a:spcPct val="105000"/>
-              </a:lnSpc>
-              <a:spcBef>
-                <a:spcPts val="600"/>
-              </a:spcBef>
-              <a:spcAft>
-                <a:spcPts val="600"/>
-              </a:spcAft>
-              <a:buFont typeface="Wingdings" panose="05000000000000000000" pitchFamily="2" charset="2"/>
-              <a:buChar char="§"/>
-              <a:defRPr sz="2598" kern="1200">
-                <a:solidFill>
-                  <a:schemeClr val="tx1"/>
-                </a:solidFill>
-                <a:latin typeface="+mn-lt"/>
-                <a:ea typeface="+mn-ea"/>
-                <a:cs typeface="+mn-cs"/>
-              </a:defRPr>
-            </a:lvl5pPr>
-            <a:lvl6pPr marL="3350704" indent="-304610" algn="l" defTabSz="1218438" rtl="0" eaLnBrk="1" latinLnBrk="1" hangingPunct="1">
-              <a:spcBef>
-                <a:spcPct val="20000"/>
-              </a:spcBef>
-              <a:buFont typeface="Arial" pitchFamily="34" charset="0"/>
-              <a:buChar char="•"/>
-              <a:defRPr sz="2665" kern="1200">
-                <a:solidFill>
-                  <a:schemeClr val="tx1"/>
-                </a:solidFill>
-                <a:latin typeface="+mn-lt"/>
-                <a:ea typeface="+mn-ea"/>
-                <a:cs typeface="+mn-cs"/>
-              </a:defRPr>
-            </a:lvl6pPr>
-            <a:lvl7pPr marL="3959924" indent="-304610" algn="l" defTabSz="1218438" rtl="0" eaLnBrk="1" latinLnBrk="1" hangingPunct="1">
-              <a:spcBef>
-                <a:spcPct val="20000"/>
-              </a:spcBef>
-              <a:buFont typeface="Arial" pitchFamily="34" charset="0"/>
-              <a:buChar char="•"/>
-              <a:defRPr sz="2665" kern="1200">
-                <a:solidFill>
-                  <a:schemeClr val="tx1"/>
-                </a:solidFill>
-                <a:latin typeface="+mn-lt"/>
-                <a:ea typeface="+mn-ea"/>
-                <a:cs typeface="+mn-cs"/>
-              </a:defRPr>
-            </a:lvl7pPr>
-            <a:lvl8pPr marL="4569143" indent="-304610" algn="l" defTabSz="1218438" rtl="0" eaLnBrk="1" latinLnBrk="1" hangingPunct="1">
-              <a:spcBef>
-                <a:spcPct val="20000"/>
-              </a:spcBef>
-              <a:buFont typeface="Arial" pitchFamily="34" charset="0"/>
-              <a:buChar char="•"/>
-              <a:defRPr sz="2665" kern="1200">
-                <a:solidFill>
-                  <a:schemeClr val="tx1"/>
-                </a:solidFill>
-                <a:latin typeface="+mn-lt"/>
-                <a:ea typeface="+mn-ea"/>
-                <a:cs typeface="+mn-cs"/>
-              </a:defRPr>
-            </a:lvl8pPr>
-            <a:lvl9pPr marL="5178362" indent="-304610" algn="l" defTabSz="1218438" rtl="0" eaLnBrk="1" latinLnBrk="1" hangingPunct="1">
-              <a:spcBef>
-                <a:spcPct val="20000"/>
-              </a:spcBef>
-              <a:buFont typeface="Arial" pitchFamily="34" charset="0"/>
-              <a:buChar char="•"/>
-              <a:defRPr sz="2665" kern="1200">
-                <a:solidFill>
-                  <a:schemeClr val="tx1"/>
-                </a:solidFill>
-                <a:latin typeface="+mn-lt"/>
-                <a:ea typeface="+mn-ea"/>
-                <a:cs typeface="+mn-cs"/>
-              </a:defRPr>
-            </a:lvl9pPr>
-          </a:lstStyle>
-          <a:p>
-            <a:pPr marL="0" marR="0" lvl="0" indent="0" algn="ctr" defTabSz="1218438" rtl="0" eaLnBrk="1" fontAlgn="auto" latinLnBrk="1" hangingPunct="1">
-              <a:lnSpc>
-                <a:spcPct val="105000"/>
-              </a:lnSpc>
-              <a:spcBef>
-                <a:spcPts val="600"/>
-              </a:spcBef>
-              <a:spcAft>
-                <a:spcPts val="600"/>
-              </a:spcAft>
-              <a:buClrTx/>
-              <a:buSzTx/>
-              <a:buFont typeface="Wingdings" panose="05000000000000000000" pitchFamily="2" charset="2"/>
-              <a:buNone/>
-              <a:tabLst/>
-              <a:defRPr/>
-            </a:pPr>
-            <a:endParaRPr kumimoji="0" lang="bg-BG" sz="3398" b="1" i="0" u="none" strike="noStrike" kern="1200" cap="none" spc="0" normalizeH="0" baseline="0" noProof="0" dirty="0">
-              <a:ln>
-                <a:noFill/>
-              </a:ln>
-              <a:solidFill>
-                <a:srgbClr val="234465"/>
-              </a:solidFill>
-              <a:effectLst/>
-              <a:uLnTx/>
-              <a:uFillTx/>
-              <a:latin typeface="Calibri" panose="020F0502020204030204"/>
-              <a:ea typeface="+mn-ea"/>
-              <a:cs typeface="+mn-cs"/>
-            </a:endParaRPr>
-          </a:p>
-          <a:p>
-            <a:pPr marL="0" marR="0" lvl="0" indent="0" algn="ctr" defTabSz="1218438" rtl="0" eaLnBrk="1" fontAlgn="auto" latinLnBrk="1" hangingPunct="1">
-              <a:lnSpc>
-                <a:spcPct val="105000"/>
-              </a:lnSpc>
-              <a:spcBef>
-                <a:spcPts val="600"/>
-              </a:spcBef>
-              <a:spcAft>
-                <a:spcPts val="600"/>
-              </a:spcAft>
-              <a:buClrTx/>
-              <a:buSzTx/>
-              <a:buFont typeface="Wingdings" panose="05000000000000000000" pitchFamily="2" charset="2"/>
-              <a:buNone/>
-              <a:tabLst/>
-              <a:defRPr/>
-            </a:pPr>
-            <a:r>
-              <a:rPr kumimoji="0" lang="en-US" sz="7200" b="1" i="0" u="sng" strike="noStrike" kern="1200" cap="none" spc="0" normalizeH="0" baseline="0" noProof="0" dirty="0">
-                <a:ln>
-                  <a:noFill/>
-                </a:ln>
-                <a:solidFill>
-                  <a:srgbClr val="FFA000"/>
-                </a:solidFill>
-                <a:effectLst/>
-                <a:uLnTx/>
-                <a:uFillTx/>
-                <a:latin typeface="Calibri" panose="020F0502020204030204"/>
-                <a:ea typeface="+mn-ea"/>
-                <a:cs typeface="+mn-cs"/>
-              </a:rPr>
-              <a:t>sli.do</a:t>
-            </a:r>
-            <a:br>
-              <a:rPr kumimoji="0" lang="en-US" sz="6000" b="1" i="0" u="none" strike="noStrike" kern="1200" cap="none" spc="0" normalizeH="0" baseline="0" noProof="0" dirty="0">
-                <a:ln>
-                  <a:noFill/>
-                </a:ln>
-                <a:solidFill>
-                  <a:srgbClr val="234465"/>
-                </a:solidFill>
-                <a:effectLst/>
-                <a:uLnTx/>
-                <a:uFillTx/>
-                <a:latin typeface="Calibri" panose="020F0502020204030204"/>
-                <a:ea typeface="+mn-ea"/>
-                <a:cs typeface="+mn-cs"/>
-              </a:rPr>
-            </a:br>
-            <a:r>
-              <a:rPr kumimoji="0" lang="en-US" sz="11500" b="1" i="0" u="none" strike="noStrike" kern="1200" cap="none" spc="0" normalizeH="0" baseline="0" noProof="0" dirty="0">
-                <a:ln>
-                  <a:noFill/>
-                </a:ln>
-                <a:solidFill>
-                  <a:srgbClr val="234465"/>
-                </a:solidFill>
-                <a:effectLst/>
-                <a:uLnTx/>
-                <a:uFillTx/>
-                <a:latin typeface="Calibri" panose="020F0502020204030204"/>
-                <a:ea typeface="+mn-ea"/>
-                <a:cs typeface="+mn-cs"/>
-              </a:rPr>
-              <a:t>#</a:t>
-            </a:r>
-            <a:r>
-              <a:rPr kumimoji="0" lang="en-US" sz="11500" b="1" i="0" u="none" strike="noStrike" kern="1200" cap="none" spc="0" normalizeH="0" baseline="0" noProof="1">
-                <a:ln>
-                  <a:noFill/>
-                </a:ln>
-                <a:solidFill>
-                  <a:srgbClr val="234465"/>
-                </a:solidFill>
-                <a:effectLst/>
-                <a:uLnTx/>
-                <a:uFillTx/>
-                <a:latin typeface="Calibri" panose="020F0502020204030204"/>
-                <a:ea typeface="+mn-ea"/>
-                <a:cs typeface="+mn-cs"/>
-              </a:rPr>
-              <a:t>csharp</a:t>
-            </a:r>
-            <a:r>
-              <a:rPr kumimoji="0" lang="bg-BG" sz="11500" b="1" i="0" u="none" strike="noStrike" kern="1200" cap="none" spc="0" normalizeH="0" baseline="0" noProof="1">
-                <a:ln>
-                  <a:noFill/>
-                </a:ln>
-                <a:solidFill>
-                  <a:srgbClr val="234465"/>
-                </a:solidFill>
-                <a:effectLst/>
-                <a:uLnTx/>
-                <a:uFillTx/>
-                <a:latin typeface="Calibri" panose="020F0502020204030204"/>
-                <a:ea typeface="+mn-ea"/>
-                <a:cs typeface="+mn-cs"/>
-              </a:rPr>
-              <a:t>-</a:t>
-            </a:r>
-            <a:r>
-              <a:rPr kumimoji="0" lang="en-US" sz="11500" b="1" i="0" u="none" strike="noStrike" kern="1200" cap="none" spc="0" normalizeH="0" baseline="0" noProof="1">
-                <a:ln>
-                  <a:noFill/>
-                </a:ln>
-                <a:solidFill>
-                  <a:srgbClr val="234465"/>
-                </a:solidFill>
-                <a:effectLst/>
-                <a:uLnTx/>
-                <a:uFillTx/>
-                <a:latin typeface="Calibri" panose="020F0502020204030204"/>
-                <a:ea typeface="+mn-ea"/>
-                <a:cs typeface="+mn-cs"/>
-              </a:rPr>
-              <a:t>advanced</a:t>
-            </a:r>
-            <a:endParaRPr kumimoji="0" lang="en-US" sz="3398" b="0" i="0" u="none" strike="noStrike" kern="1200" cap="none" spc="0" normalizeH="0" baseline="0" noProof="1">
-              <a:ln>
-                <a:noFill/>
-              </a:ln>
-              <a:solidFill>
-                <a:srgbClr val="234465"/>
-              </a:solidFill>
-              <a:effectLst/>
-              <a:uLnTx/>
-              <a:uFillTx/>
-              <a:latin typeface="Calibri" panose="020F0502020204030204"/>
-              <a:ea typeface="+mn-ea"/>
-              <a:cs typeface="+mn-cs"/>
-            </a:endParaRPr>
-          </a:p>
-        </p:txBody>
-      </p:sp>
-      <p:sp>
-        <p:nvSpPr>
-          <p:cNvPr id="6" name="Slide Number">
-            <a:extLst>
-              <a:ext uri="{FF2B5EF4-FFF2-40B4-BE49-F238E27FC236}">
-                <a16:creationId xmlns:a16="http://schemas.microsoft.com/office/drawing/2014/main" id="{343B277F-EB76-4869-BEB4-DF5CD675D553}"/>
-              </a:ext>
-            </a:extLst>
-          </p:cNvPr>
-          <p:cNvSpPr>
-            <a:spLocks noGrp="1"/>
-          </p:cNvSpPr>
-          <p:nvPr>
-            <p:ph type="sldNum" sz="quarter" idx="5"/>
-          </p:nvPr>
-        </p:nvSpPr>
-        <p:spPr>
-          <a:xfrm>
-            <a:off x="11753030" y="6507000"/>
-            <a:ext cx="367414" cy="297000"/>
-          </a:xfrm>
-          <a:prstGeom prst="rect">
-            <a:avLst/>
-          </a:prstGeom>
-        </p:spPr>
-        <p:txBody>
-          <a:bodyPr vert="horz" lIns="91440" tIns="45720" rIns="91440" bIns="45720" rtlCol="0" anchor="b"/>
-          <a:lstStyle>
-            <a:lvl1pPr algn="r">
-              <a:defRPr sz="1000"/>
-            </a:lvl1pPr>
-          </a:lstStyle>
-          <a:p>
-            <a:fld id="{2BF067CD-8E6B-4360-9AA8-C5DF2A48A6D1}" type="slidenum">
-              <a:rPr lang="en-US" noProof="0" smtClean="0"/>
-              <a:pPr/>
-              <a:t>3</a:t>
-            </a:fld>
-            <a:endParaRPr lang="en-US" noProof="0" dirty="0"/>
-          </a:p>
-        </p:txBody>
-      </p:sp>
-    </p:spTree>
-    <p:extLst>
-      <p:ext uri="{BB962C8B-B14F-4D97-AF65-F5344CB8AC3E}">
-        <p14:creationId xmlns:p14="http://schemas.microsoft.com/office/powerpoint/2010/main" val="2457963006"/>
-      </p:ext>
-    </p:extLst>
-  </p:cSld>
-  <p:clrMapOvr>
-    <a:masterClrMapping/>
-  </p:clrMapOvr>
-  <mc:AlternateContent xmlns:mc="http://schemas.openxmlformats.org/markup-compatibility/2006" xmlns:p14="http://schemas.microsoft.com/office/powerpoint/2010/main">
-    <mc:Choice Requires="p14">
-      <p:transition spd="med" p14:dur="700" advClick="0" advTm="5000">
-        <p:fade/>
-      </p:transition>
-    </mc:Choice>
-    <mc:Fallback xmlns="">
-      <p:transition spd="med" advClick="0" advTm="5000">
-        <p:fade/>
-      </p:transition>
     </mc:Fallback>
   </mc:AlternateContent>
 </p:sld>
@@ -27281,6 +28041,117 @@
           <a:chExt cx="0" cy="0"/>
         </a:xfrm>
       </p:grpSpPr>
+      <p:pic>
+        <p:nvPicPr>
+          <p:cNvPr id="7" name="Picture 6"/>
+          <p:cNvPicPr>
+            <a:picLocks noChangeAspect="1"/>
+          </p:cNvPicPr>
+          <p:nvPr/>
+        </p:nvPicPr>
+        <p:blipFill>
+          <a:blip r:embed="rId2">
+            <a:extLst>
+              <a:ext uri="{28A0092B-C50C-407E-A947-70E740481C1C}">
+                <a14:useLocalDpi xmlns:a14="http://schemas.microsoft.com/office/drawing/2010/main" val="0"/>
+              </a:ext>
+            </a:extLst>
+          </a:blip>
+          <a:stretch>
+            <a:fillRect/>
+          </a:stretch>
+        </p:blipFill>
+        <p:spPr>
+          <a:xfrm>
+            <a:off x="4520334" y="1143141"/>
+            <a:ext cx="3094072" cy="2874674"/>
+          </a:xfrm>
+          <a:prstGeom prst="rect">
+            <a:avLst/>
+          </a:prstGeom>
+        </p:spPr>
+      </p:pic>
+      <p:sp>
+        <p:nvSpPr>
+          <p:cNvPr id="4" name="Title 3">
+            <a:extLst>
+              <a:ext uri="{FF2B5EF4-FFF2-40B4-BE49-F238E27FC236}">
+                <a16:creationId xmlns:a16="http://schemas.microsoft.com/office/drawing/2014/main" id="{B3BF449D-CC37-453C-BBCA-5D75DD02E382}"/>
+              </a:ext>
+            </a:extLst>
+          </p:cNvPr>
+          <p:cNvSpPr>
+            <a:spLocks noGrp="1"/>
+          </p:cNvSpPr>
+          <p:nvPr>
+            <p:ph type="title" sz="quarter" idx="10"/>
+          </p:nvPr>
+        </p:nvSpPr>
+        <p:spPr/>
+        <p:txBody>
+          <a:bodyPr/>
+          <a:lstStyle/>
+          <a:p>
+            <a:pPr>
+              <a:lnSpc>
+                <a:spcPct val="110000"/>
+              </a:lnSpc>
+              <a:buClr>
+                <a:schemeClr val="tx1"/>
+              </a:buClr>
+              <a:buSzPct val="100000"/>
+            </a:pPr>
+            <a:r>
+              <a:rPr lang="en-US" sz="5400" dirty="0">
+                <a:cs typeface="Consolas" panose="020B0609020204030204" pitchFamily="49" charset="0"/>
+              </a:rPr>
+              <a:t>Generic Classes</a:t>
+            </a:r>
+          </a:p>
+        </p:txBody>
+      </p:sp>
+    </p:spTree>
+    <p:extLst>
+      <p:ext uri="{BB962C8B-B14F-4D97-AF65-F5344CB8AC3E}">
+        <p14:creationId xmlns:p14="http://schemas.microsoft.com/office/powerpoint/2010/main" val="3360436741"/>
+      </p:ext>
+    </p:extLst>
+  </p:cSld>
+  <p:clrMapOvr>
+    <a:masterClrMapping/>
+  </p:clrMapOvr>
+  <mc:AlternateContent xmlns:mc="http://schemas.openxmlformats.org/markup-compatibility/2006" xmlns:p14="http://schemas.microsoft.com/office/powerpoint/2010/main">
+    <mc:Choice Requires="p14">
+      <p:transition spd="med" p14:dur="700" advClick="0" advTm="5000">
+        <p:fade/>
+      </p:transition>
+    </mc:Choice>
+    <mc:Fallback xmlns="">
+      <p:transition spd="med" advClick="0" advTm="5000">
+        <p:fade/>
+      </p:transition>
+    </mc:Fallback>
+  </mc:AlternateContent>
+</p:sld>
+</file>
+
+<file path=ppt/slides/slide9.xml><?xml version="1.0" encoding="utf-8"?>
+<p:sld xmlns:a="http://schemas.openxmlformats.org/drawingml/2006/main" xmlns:r="http://schemas.openxmlformats.org/officeDocument/2006/relationships" xmlns:p="http://schemas.openxmlformats.org/presentationml/2006/main">
+  <p:cSld>
+    <p:spTree>
+      <p:nvGrpSpPr>
+        <p:cNvPr id="1" name=""/>
+        <p:cNvGrpSpPr/>
+        <p:nvPr/>
+      </p:nvGrpSpPr>
+      <p:grpSpPr>
+        <a:xfrm>
+          <a:off x="0" y="0"/>
+          <a:ext cx="0" cy="0"/>
+          <a:chOff x="0" y="0"/>
+          <a:chExt cx="0" cy="0"/>
+        </a:xfrm>
+      </p:grpSpPr>
       <p:sp>
         <p:nvSpPr>
           <p:cNvPr id="3" name="Title 2">
@@ -27728,7 +28599,7 @@
             <a:fld id="{2BF067CD-8E6B-4360-9AA8-C5DF2A48A6D1}" type="slidenum">
               <a:rPr lang="en-US" noProof="0" smtClean="0"/>
               <a:pPr/>
-              <a:t>8</a:t>
+              <a:t>9</a:t>
             </a:fld>
             <a:endParaRPr lang="en-US" noProof="0" dirty="0"/>
           </a:p>
@@ -28064,639 +28935,6 @@
                                           <p:spTgt spid="6">
                                             <p:txEl>
                                               <p:pRg st="9" end="9"/>
-                                            </p:txEl>
-                                          </p:spTgt>
-                                        </p:tgtEl>
-                                        <p:attrNameLst>
-                                          <p:attrName>style.visibility</p:attrName>
-                                        </p:attrNameLst>
-                                      </p:cBhvr>
-                                      <p:to>
-                                        <p:strVal val="visible"/>
-                                      </p:to>
-                                    </p:set>
-                                  </p:childTnLst>
-                                </p:cTn>
-                              </p:par>
-                            </p:childTnLst>
-                          </p:cTn>
-                        </p:par>
-                      </p:childTnLst>
-                    </p:cTn>
-                  </p:par>
-                </p:childTnLst>
-              </p:cTn>
-              <p:prevCondLst>
-                <p:cond evt="onPrev" delay="0">
-                  <p:tgtEl>
-                    <p:sldTgt/>
-                  </p:tgtEl>
-                </p:cond>
-              </p:prevCondLst>
-              <p:nextCondLst>
-                <p:cond evt="onNext" delay="0">
-                  <p:tgtEl>
-                    <p:sldTgt/>
-                  </p:tgtEl>
-                </p:cond>
-              </p:nextCondLst>
-            </p:seq>
-          </p:childTnLst>
-        </p:cTn>
-      </p:par>
-    </p:tnLst>
-  </p:timing>
-</p:sld>
-</file>
-
-<file path=ppt/slides/slide9.xml><?xml version="1.0" encoding="utf-8"?>
-<p:sld xmlns:a="http://schemas.openxmlformats.org/drawingml/2006/main" xmlns:r="http://schemas.openxmlformats.org/officeDocument/2006/relationships" xmlns:p="http://schemas.openxmlformats.org/presentationml/2006/main">
-  <p:cSld>
-    <p:spTree>
-      <p:nvGrpSpPr>
-        <p:cNvPr id="1" name=""/>
-        <p:cNvGrpSpPr/>
-        <p:nvPr/>
-      </p:nvGrpSpPr>
-      <p:grpSpPr>
-        <a:xfrm>
-          <a:off x="0" y="0"/>
-          <a:ext cx="0" cy="0"/>
-          <a:chOff x="0" y="0"/>
-          <a:chExt cx="0" cy="0"/>
-        </a:xfrm>
-      </p:grpSpPr>
-      <p:sp>
-        <p:nvSpPr>
-          <p:cNvPr id="3" name="Title 2">
-            <a:extLst>
-              <a:ext uri="{FF2B5EF4-FFF2-40B4-BE49-F238E27FC236}">
-                <a16:creationId xmlns:a16="http://schemas.microsoft.com/office/drawing/2014/main" id="{AA9976E6-2ADB-413C-8F13-DA6222355395}"/>
-              </a:ext>
-            </a:extLst>
-          </p:cNvPr>
-          <p:cNvSpPr>
-            <a:spLocks noGrp="1"/>
-          </p:cNvSpPr>
-          <p:nvPr>
-            <p:ph type="title"/>
-          </p:nvPr>
-        </p:nvSpPr>
-        <p:spPr/>
-        <p:txBody>
-          <a:bodyPr/>
-          <a:lstStyle/>
-          <a:p>
-            <a:r>
-              <a:rPr lang="en-US" dirty="0"/>
-              <a:t>Non-Generic Classes (2)</a:t>
-            </a:r>
-          </a:p>
-        </p:txBody>
-      </p:sp>
-      <p:sp>
-        <p:nvSpPr>
-          <p:cNvPr id="6" name="Rectangle 5">
-            <a:extLst>
-              <a:ext uri="{FF2B5EF4-FFF2-40B4-BE49-F238E27FC236}">
-                <a16:creationId xmlns:a16="http://schemas.microsoft.com/office/drawing/2014/main" id="{043CAAB1-1BB5-4293-8AF9-ED1802C625D6}"/>
-              </a:ext>
-            </a:extLst>
-          </p:cNvPr>
-          <p:cNvSpPr>
-            <a:spLocks noChangeArrowheads="1"/>
-          </p:cNvSpPr>
-          <p:nvPr/>
-        </p:nvSpPr>
-        <p:spPr bwMode="auto">
-          <a:xfrm>
-            <a:off x="841248" y="2259000"/>
-            <a:ext cx="10509504" cy="3517032"/>
-          </a:xfrm>
-          <a:prstGeom prst="rect">
-            <a:avLst/>
-          </a:prstGeom>
-          <a:solidFill>
-            <a:schemeClr val="tx1">
-              <a:lumMod val="40000"/>
-              <a:lumOff val="60000"/>
-              <a:alpha val="15000"/>
-            </a:schemeClr>
-          </a:solidFill>
-          <a:ln w="12700">
-            <a:solidFill>
-              <a:schemeClr val="accent5">
-                <a:lumMod val="60000"/>
-                <a:lumOff val="40000"/>
-              </a:schemeClr>
-            </a:solidFill>
-          </a:ln>
-        </p:spPr>
-        <p:txBody>
-          <a:bodyPr wrap="square" lIns="432000" tIns="183600" rIns="432000" bIns="183600">
-            <a:spAutoFit/>
-          </a:bodyPr>
-          <a:lstStyle/>
-          <a:p>
-            <a:pPr eaLnBrk="0" hangingPunct="0">
-              <a:lnSpc>
-                <a:spcPct val="105000"/>
-              </a:lnSpc>
-              <a:buClr>
-                <a:schemeClr val="accent5">
-                  <a:lumMod val="40000"/>
-                  <a:lumOff val="60000"/>
-                </a:schemeClr>
-              </a:buClr>
-              <a:buSzPct val="70000"/>
-            </a:pPr>
-            <a:r>
-              <a:rPr lang="en-US" sz="2800" b="1" noProof="1">
-                <a:latin typeface="Consolas" pitchFamily="49" charset="0"/>
-                <a:cs typeface="Consolas" pitchFamily="49" charset="0"/>
-              </a:rPr>
-              <a:t>var objectList = new </a:t>
-            </a:r>
-            <a:r>
-              <a:rPr lang="en-US" sz="2800" b="1" noProof="1">
-                <a:solidFill>
-                  <a:schemeClr val="bg1"/>
-                </a:solidFill>
-                <a:latin typeface="Consolas" pitchFamily="49" charset="0"/>
-                <a:cs typeface="Consolas" pitchFamily="49" charset="0"/>
-              </a:rPr>
-              <a:t>ObjectList();</a:t>
-            </a:r>
-          </a:p>
-          <a:p>
-            <a:pPr eaLnBrk="0" hangingPunct="0">
-              <a:lnSpc>
-                <a:spcPct val="105000"/>
-              </a:lnSpc>
-              <a:buClr>
-                <a:schemeClr val="accent5">
-                  <a:lumMod val="40000"/>
-                  <a:lumOff val="60000"/>
-                </a:schemeClr>
-              </a:buClr>
-              <a:buSzPct val="70000"/>
-            </a:pPr>
-            <a:r>
-              <a:rPr lang="en-US" sz="2800" b="1" noProof="1">
-                <a:latin typeface="Consolas" pitchFamily="49" charset="0"/>
-                <a:cs typeface="Consolas" pitchFamily="49" charset="0"/>
-              </a:rPr>
-              <a:t>objectList.Add(1);</a:t>
-            </a:r>
-          </a:p>
-          <a:p>
-            <a:pPr eaLnBrk="0" hangingPunct="0">
-              <a:lnSpc>
-                <a:spcPct val="105000"/>
-              </a:lnSpc>
-              <a:buClr>
-                <a:schemeClr val="accent5">
-                  <a:lumMod val="40000"/>
-                  <a:lumOff val="60000"/>
-                </a:schemeClr>
-              </a:buClr>
-              <a:buSzPct val="70000"/>
-            </a:pPr>
-            <a:r>
-              <a:rPr lang="en-US" sz="2800" b="1" noProof="1">
-                <a:latin typeface="Consolas" pitchFamily="49" charset="0"/>
-                <a:cs typeface="Consolas" pitchFamily="49" charset="0"/>
-              </a:rPr>
-              <a:t>objectList.Add(new Customer());</a:t>
-            </a:r>
-          </a:p>
-          <a:p>
-            <a:pPr eaLnBrk="0" hangingPunct="0">
-              <a:lnSpc>
-                <a:spcPct val="105000"/>
-              </a:lnSpc>
-              <a:buClr>
-                <a:schemeClr val="accent5">
-                  <a:lumMod val="40000"/>
-                  <a:lumOff val="60000"/>
-                </a:schemeClr>
-              </a:buClr>
-              <a:buSzPct val="70000"/>
-            </a:pPr>
-            <a:r>
-              <a:rPr lang="en-US" sz="2800" b="1" noProof="1">
-                <a:latin typeface="Consolas" pitchFamily="49" charset="0"/>
-                <a:cs typeface="Consolas" pitchFamily="49" charset="0"/>
-              </a:rPr>
-              <a:t>objectList.Add(new Account());</a:t>
-            </a:r>
-          </a:p>
-          <a:p>
-            <a:pPr eaLnBrk="0" hangingPunct="0">
-              <a:lnSpc>
-                <a:spcPct val="105000"/>
-              </a:lnSpc>
-              <a:buClr>
-                <a:schemeClr val="accent5">
-                  <a:lumMod val="40000"/>
-                  <a:lumOff val="60000"/>
-                </a:schemeClr>
-              </a:buClr>
-              <a:buSzPct val="70000"/>
-            </a:pPr>
-            <a:endParaRPr lang="en-US" sz="2800" b="1" noProof="1">
-              <a:latin typeface="Consolas" pitchFamily="49" charset="0"/>
-              <a:cs typeface="Consolas" pitchFamily="49" charset="0"/>
-            </a:endParaRPr>
-          </a:p>
-          <a:p>
-            <a:pPr eaLnBrk="0" hangingPunct="0">
-              <a:lnSpc>
-                <a:spcPct val="105000"/>
-              </a:lnSpc>
-              <a:buClr>
-                <a:schemeClr val="accent5">
-                  <a:lumMod val="40000"/>
-                  <a:lumOff val="60000"/>
-                </a:schemeClr>
-              </a:buClr>
-              <a:buSzPct val="70000"/>
-            </a:pPr>
-            <a:r>
-              <a:rPr lang="en-US" sz="2800" b="1" noProof="1">
-                <a:latin typeface="Consolas" pitchFamily="49" charset="0"/>
-              </a:rPr>
-              <a:t>var firItem = objectList[0];</a:t>
-            </a:r>
-            <a:r>
-              <a:rPr lang="en-US" sz="2800" b="1" noProof="1">
-                <a:solidFill>
-                  <a:schemeClr val="tx2"/>
-                </a:solidFill>
-                <a:latin typeface="Consolas" pitchFamily="49" charset="0"/>
-              </a:rPr>
-              <a:t> </a:t>
-            </a:r>
-            <a:r>
-              <a:rPr lang="en-US" sz="2800" b="1" i="1" noProof="1">
-                <a:solidFill>
-                  <a:schemeClr val="accent2"/>
-                </a:solidFill>
-                <a:latin typeface="Consolas" pitchFamily="49" charset="0"/>
-                <a:cs typeface="Consolas" pitchFamily="49" charset="0"/>
-              </a:rPr>
-              <a:t>// firItem is object</a:t>
-            </a:r>
-          </a:p>
-          <a:p>
-            <a:pPr eaLnBrk="0" hangingPunct="0">
-              <a:lnSpc>
-                <a:spcPct val="105000"/>
-              </a:lnSpc>
-              <a:buClr>
-                <a:schemeClr val="accent5">
-                  <a:lumMod val="40000"/>
-                  <a:lumOff val="60000"/>
-                </a:schemeClr>
-              </a:buClr>
-              <a:buSzPct val="70000"/>
-            </a:pPr>
-            <a:r>
-              <a:rPr lang="en-US" sz="2800" b="1" noProof="1">
-                <a:latin typeface="Consolas" pitchFamily="49" charset="0"/>
-              </a:rPr>
-              <a:t>var secItem = (</a:t>
-            </a:r>
-            <a:r>
-              <a:rPr lang="en-US" sz="2800" b="1" noProof="1">
-                <a:solidFill>
-                  <a:schemeClr val="bg1"/>
-                </a:solidFill>
-                <a:latin typeface="Consolas" pitchFamily="49" charset="0"/>
-              </a:rPr>
-              <a:t>Customer</a:t>
-            </a:r>
-            <a:r>
-              <a:rPr lang="en-US" sz="2800" b="1" noProof="1">
-                <a:latin typeface="Consolas" pitchFamily="49" charset="0"/>
-              </a:rPr>
-              <a:t>)objectList[2]; </a:t>
-            </a:r>
-            <a:r>
-              <a:rPr lang="en-US" sz="2800" b="1" i="1" noProof="1">
-                <a:solidFill>
-                  <a:schemeClr val="accent2"/>
-                </a:solidFill>
-                <a:latin typeface="Consolas" pitchFamily="49" charset="0"/>
-              </a:rPr>
-              <a:t>// cast</a:t>
-            </a:r>
-            <a:endParaRPr lang="en-US" sz="2800" b="1" noProof="1">
-              <a:solidFill>
-                <a:schemeClr val="tx2"/>
-              </a:solidFill>
-              <a:latin typeface="Consolas" pitchFamily="49" charset="0"/>
-            </a:endParaRPr>
-          </a:p>
-        </p:txBody>
-      </p:sp>
-      <p:sp>
-        <p:nvSpPr>
-          <p:cNvPr id="7" name="Slide Number">
-            <a:extLst>
-              <a:ext uri="{FF2B5EF4-FFF2-40B4-BE49-F238E27FC236}">
-                <a16:creationId xmlns:a16="http://schemas.microsoft.com/office/drawing/2014/main" id="{642C83EC-1CF0-4404-9F04-6ED1A01704B5}"/>
-              </a:ext>
-            </a:extLst>
-          </p:cNvPr>
-          <p:cNvSpPr>
-            <a:spLocks noGrp="1"/>
-          </p:cNvSpPr>
-          <p:nvPr>
-            <p:ph type="sldNum" sz="quarter" idx="5"/>
-          </p:nvPr>
-        </p:nvSpPr>
-        <p:spPr>
-          <a:xfrm>
-            <a:off x="11753030" y="6507000"/>
-            <a:ext cx="367414" cy="297000"/>
-          </a:xfrm>
-          <a:prstGeom prst="rect">
-            <a:avLst/>
-          </a:prstGeom>
-        </p:spPr>
-        <p:txBody>
-          <a:bodyPr vert="horz" lIns="91440" tIns="45720" rIns="91440" bIns="45720" rtlCol="0" anchor="b"/>
-          <a:lstStyle>
-            <a:lvl1pPr algn="r">
-              <a:defRPr sz="1000"/>
-            </a:lvl1pPr>
-          </a:lstStyle>
-          <a:p>
-            <a:fld id="{2BF067CD-8E6B-4360-9AA8-C5DF2A48A6D1}" type="slidenum">
-              <a:rPr lang="en-US" noProof="0" smtClean="0"/>
-              <a:pPr/>
-              <a:t>9</a:t>
-            </a:fld>
-            <a:endParaRPr lang="en-US" noProof="0" dirty="0"/>
-          </a:p>
-        </p:txBody>
-      </p:sp>
-    </p:spTree>
-    <p:extLst>
-      <p:ext uri="{BB962C8B-B14F-4D97-AF65-F5344CB8AC3E}">
-        <p14:creationId xmlns:p14="http://schemas.microsoft.com/office/powerpoint/2010/main" val="1772326377"/>
-      </p:ext>
-    </p:extLst>
-  </p:cSld>
-  <p:clrMapOvr>
-    <a:masterClrMapping/>
-  </p:clrMapOvr>
-  <mc:AlternateContent xmlns:mc="http://schemas.openxmlformats.org/markup-compatibility/2006" xmlns:p14="http://schemas.microsoft.com/office/powerpoint/2010/main">
-    <mc:Choice Requires="p14">
-      <p:transition spd="med" p14:dur="700" advClick="0" advTm="5000">
-        <p:fade/>
-      </p:transition>
-    </mc:Choice>
-    <mc:Fallback xmlns="">
-      <p:transition spd="med" advClick="0" advTm="5000">
-        <p:fade/>
-      </p:transition>
-    </mc:Fallback>
-  </mc:AlternateContent>
-  <p:timing>
-    <p:tnLst>
-      <p:par>
-        <p:cTn id="1" dur="indefinite" restart="never" nodeType="tmRoot">
-          <p:childTnLst>
-            <p:seq concurrent="1" nextAc="seek">
-              <p:cTn id="2" dur="indefinite" nodeType="mainSeq">
-                <p:childTnLst>
-                  <p:par>
-                    <p:cTn id="3" fill="hold">
-                      <p:stCondLst>
-                        <p:cond delay="indefinite"/>
-                      </p:stCondLst>
-                      <p:childTnLst>
-                        <p:par>
-                          <p:cTn id="4" fill="hold">
-                            <p:stCondLst>
-                              <p:cond delay="0"/>
-                            </p:stCondLst>
-                            <p:childTnLst>
-                              <p:par>
-                                <p:cTn id="5" presetID="1" presetClass="entr" presetSubtype="0" fill="hold" nodeType="clickEffect">
-                                  <p:stCondLst>
-                                    <p:cond delay="0"/>
-                                  </p:stCondLst>
-                                  <p:childTnLst>
-                                    <p:set>
-                                      <p:cBhvr>
-                                        <p:cTn id="6" dur="1" fill="hold">
-                                          <p:stCondLst>
-                                            <p:cond delay="0"/>
-                                          </p:stCondLst>
-                                        </p:cTn>
-                                        <p:tgtEl>
-                                          <p:spTgt spid="6">
-                                            <p:txEl>
-                                              <p:pRg st="1" end="1"/>
-                                            </p:txEl>
-                                          </p:spTgt>
-                                        </p:tgtEl>
-                                        <p:attrNameLst>
-                                          <p:attrName>style.visibility</p:attrName>
-                                        </p:attrNameLst>
-                                      </p:cBhvr>
-                                      <p:to>
-                                        <p:strVal val="visible"/>
-                                      </p:to>
-                                    </p:set>
-                                  </p:childTnLst>
-                                </p:cTn>
-                              </p:par>
-                            </p:childTnLst>
-                          </p:cTn>
-                        </p:par>
-                      </p:childTnLst>
-                    </p:cTn>
-                  </p:par>
-                  <p:par>
-                    <p:cTn id="7" fill="hold">
-                      <p:stCondLst>
-                        <p:cond delay="indefinite"/>
-                      </p:stCondLst>
-                      <p:childTnLst>
-                        <p:par>
-                          <p:cTn id="8" fill="hold">
-                            <p:stCondLst>
-                              <p:cond delay="0"/>
-                            </p:stCondLst>
-                            <p:childTnLst>
-                              <p:par>
-                                <p:cTn id="9" presetID="1" presetClass="entr" presetSubtype="0" fill="hold" nodeType="clickEffect">
-                                  <p:stCondLst>
-                                    <p:cond delay="0"/>
-                                  </p:stCondLst>
-                                  <p:childTnLst>
-                                    <p:set>
-                                      <p:cBhvr>
-                                        <p:cTn id="10" dur="1" fill="hold">
-                                          <p:stCondLst>
-                                            <p:cond delay="0"/>
-                                          </p:stCondLst>
-                                        </p:cTn>
-                                        <p:tgtEl>
-                                          <p:spTgt spid="6">
-                                            <p:txEl>
-                                              <p:pRg st="2" end="2"/>
-                                            </p:txEl>
-                                          </p:spTgt>
-                                        </p:tgtEl>
-                                        <p:attrNameLst>
-                                          <p:attrName>style.visibility</p:attrName>
-                                        </p:attrNameLst>
-                                      </p:cBhvr>
-                                      <p:to>
-                                        <p:strVal val="visible"/>
-                                      </p:to>
-                                    </p:set>
-                                  </p:childTnLst>
-                                </p:cTn>
-                              </p:par>
-                            </p:childTnLst>
-                          </p:cTn>
-                        </p:par>
-                      </p:childTnLst>
-                    </p:cTn>
-                  </p:par>
-                  <p:par>
-                    <p:cTn id="11" fill="hold">
-                      <p:stCondLst>
-                        <p:cond delay="indefinite"/>
-                      </p:stCondLst>
-                      <p:childTnLst>
-                        <p:par>
-                          <p:cTn id="12" fill="hold">
-                            <p:stCondLst>
-                              <p:cond delay="0"/>
-                            </p:stCondLst>
-                            <p:childTnLst>
-                              <p:par>
-                                <p:cTn id="13" presetID="1" presetClass="entr" presetSubtype="0" fill="hold" nodeType="clickEffect">
-                                  <p:stCondLst>
-                                    <p:cond delay="0"/>
-                                  </p:stCondLst>
-                                  <p:childTnLst>
-                                    <p:set>
-                                      <p:cBhvr>
-                                        <p:cTn id="14" dur="1" fill="hold">
-                                          <p:stCondLst>
-                                            <p:cond delay="0"/>
-                                          </p:stCondLst>
-                                        </p:cTn>
-                                        <p:tgtEl>
-                                          <p:spTgt spid="6">
-                                            <p:txEl>
-                                              <p:pRg st="3" end="3"/>
-                                            </p:txEl>
-                                          </p:spTgt>
-                                        </p:tgtEl>
-                                        <p:attrNameLst>
-                                          <p:attrName>style.visibility</p:attrName>
-                                        </p:attrNameLst>
-                                      </p:cBhvr>
-                                      <p:to>
-                                        <p:strVal val="visible"/>
-                                      </p:to>
-                                    </p:set>
-                                  </p:childTnLst>
-                                </p:cTn>
-                              </p:par>
-                            </p:childTnLst>
-                          </p:cTn>
-                        </p:par>
-                      </p:childTnLst>
-                    </p:cTn>
-                  </p:par>
-                  <p:par>
-                    <p:cTn id="15" fill="hold">
-                      <p:stCondLst>
-                        <p:cond delay="indefinite"/>
-                      </p:stCondLst>
-                      <p:childTnLst>
-                        <p:par>
-                          <p:cTn id="16" fill="hold">
-                            <p:stCondLst>
-                              <p:cond delay="0"/>
-                            </p:stCondLst>
-                            <p:childTnLst>
-                              <p:par>
-                                <p:cTn id="17" presetID="1" presetClass="entr" presetSubtype="0" fill="hold" nodeType="clickEffect">
-                                  <p:stCondLst>
-                                    <p:cond delay="0"/>
-                                  </p:stCondLst>
-                                  <p:childTnLst>
-                                    <p:set>
-                                      <p:cBhvr>
-                                        <p:cTn id="18" dur="1" fill="hold">
-                                          <p:stCondLst>
-                                            <p:cond delay="0"/>
-                                          </p:stCondLst>
-                                        </p:cTn>
-                                        <p:tgtEl>
-                                          <p:spTgt spid="6">
-                                            <p:txEl>
-                                              <p:pRg st="5" end="5"/>
-                                            </p:txEl>
-                                          </p:spTgt>
-                                        </p:tgtEl>
-                                        <p:attrNameLst>
-                                          <p:attrName>style.visibility</p:attrName>
-                                        </p:attrNameLst>
-                                      </p:cBhvr>
-                                      <p:to>
-                                        <p:strVal val="visible"/>
-                                      </p:to>
-                                    </p:set>
-                                  </p:childTnLst>
-                                </p:cTn>
-                              </p:par>
-                            </p:childTnLst>
-                          </p:cTn>
-                        </p:par>
-                      </p:childTnLst>
-                    </p:cTn>
-                  </p:par>
-                  <p:par>
-                    <p:cTn id="19" fill="hold">
-                      <p:stCondLst>
-                        <p:cond delay="indefinite"/>
-                      </p:stCondLst>
-                      <p:childTnLst>
-                        <p:par>
-                          <p:cTn id="20" fill="hold">
-                            <p:stCondLst>
-                              <p:cond delay="0"/>
-                            </p:stCondLst>
-                            <p:childTnLst>
-                              <p:par>
-                                <p:cTn id="21" presetID="1" presetClass="entr" presetSubtype="0" fill="hold" nodeType="clickEffect">
-                                  <p:stCondLst>
-                                    <p:cond delay="0"/>
-                                  </p:stCondLst>
-                                  <p:childTnLst>
-                                    <p:set>
-                                      <p:cBhvr>
-                                        <p:cTn id="22" dur="1" fill="hold">
-                                          <p:stCondLst>
-                                            <p:cond delay="0"/>
-                                          </p:stCondLst>
-                                        </p:cTn>
-                                        <p:tgtEl>
-                                          <p:spTgt spid="6">
-                                            <p:txEl>
-                                              <p:pRg st="6" end="6"/>
                                             </p:txEl>
                                           </p:spTgt>
                                         </p:tgtEl>

</xml_diff>